<commit_message>
Mestrado - formatação da quali de acordo com a ABNT - anotações feitas no pdf da abnt - anotações do readme - imagens criadas para a quali no ppt
</commit_message>
<xml_diff>
--- a/Imagens/imagens-quali.pptx
+++ b/Imagens/imagens-quali.pptx
@@ -12,6 +12,8 @@
     <p:sldId id="261" r:id="rId6"/>
     <p:sldId id="262" r:id="rId7"/>
     <p:sldId id="263" r:id="rId8"/>
+    <p:sldId id="264" r:id="rId9"/>
+    <p:sldId id="265" r:id="rId10"/>
   </p:sldIdLst>
   <p:sldSz cx="9144000" cy="6858000" type="screen4x3"/>
   <p:notesSz cx="6858000" cy="9144000"/>
@@ -294,7 +296,7 @@
           <a:p>
             <a:fld id="{E14A8D8A-9BF6-4F09-B8D2-3E331CA72F09}" type="datetimeFigureOut">
               <a:rPr lang="pt-BR" smtClean="0"/>
-              <a:t>21/7/2011</a:t>
+              <a:t>22/7/2011</a:t>
             </a:fld>
             <a:endParaRPr lang="pt-BR"/>
           </a:p>
@@ -464,7 +466,7 @@
           <a:p>
             <a:fld id="{E14A8D8A-9BF6-4F09-B8D2-3E331CA72F09}" type="datetimeFigureOut">
               <a:rPr lang="pt-BR" smtClean="0"/>
-              <a:t>21/7/2011</a:t>
+              <a:t>22/7/2011</a:t>
             </a:fld>
             <a:endParaRPr lang="pt-BR"/>
           </a:p>
@@ -644,7 +646,7 @@
           <a:p>
             <a:fld id="{E14A8D8A-9BF6-4F09-B8D2-3E331CA72F09}" type="datetimeFigureOut">
               <a:rPr lang="pt-BR" smtClean="0"/>
-              <a:t>21/7/2011</a:t>
+              <a:t>22/7/2011</a:t>
             </a:fld>
             <a:endParaRPr lang="pt-BR"/>
           </a:p>
@@ -814,7 +816,7 @@
           <a:p>
             <a:fld id="{E14A8D8A-9BF6-4F09-B8D2-3E331CA72F09}" type="datetimeFigureOut">
               <a:rPr lang="pt-BR" smtClean="0"/>
-              <a:t>21/7/2011</a:t>
+              <a:t>22/7/2011</a:t>
             </a:fld>
             <a:endParaRPr lang="pt-BR"/>
           </a:p>
@@ -1060,7 +1062,7 @@
           <a:p>
             <a:fld id="{E14A8D8A-9BF6-4F09-B8D2-3E331CA72F09}" type="datetimeFigureOut">
               <a:rPr lang="pt-BR" smtClean="0"/>
-              <a:t>21/7/2011</a:t>
+              <a:t>22/7/2011</a:t>
             </a:fld>
             <a:endParaRPr lang="pt-BR"/>
           </a:p>
@@ -1348,7 +1350,7 @@
           <a:p>
             <a:fld id="{E14A8D8A-9BF6-4F09-B8D2-3E331CA72F09}" type="datetimeFigureOut">
               <a:rPr lang="pt-BR" smtClean="0"/>
-              <a:t>21/7/2011</a:t>
+              <a:t>22/7/2011</a:t>
             </a:fld>
             <a:endParaRPr lang="pt-BR"/>
           </a:p>
@@ -1770,7 +1772,7 @@
           <a:p>
             <a:fld id="{E14A8D8A-9BF6-4F09-B8D2-3E331CA72F09}" type="datetimeFigureOut">
               <a:rPr lang="pt-BR" smtClean="0"/>
-              <a:t>21/7/2011</a:t>
+              <a:t>22/7/2011</a:t>
             </a:fld>
             <a:endParaRPr lang="pt-BR"/>
           </a:p>
@@ -1888,7 +1890,7 @@
           <a:p>
             <a:fld id="{E14A8D8A-9BF6-4F09-B8D2-3E331CA72F09}" type="datetimeFigureOut">
               <a:rPr lang="pt-BR" smtClean="0"/>
-              <a:t>21/7/2011</a:t>
+              <a:t>22/7/2011</a:t>
             </a:fld>
             <a:endParaRPr lang="pt-BR"/>
           </a:p>
@@ -1983,7 +1985,7 @@
           <a:p>
             <a:fld id="{E14A8D8A-9BF6-4F09-B8D2-3E331CA72F09}" type="datetimeFigureOut">
               <a:rPr lang="pt-BR" smtClean="0"/>
-              <a:t>21/7/2011</a:t>
+              <a:t>22/7/2011</a:t>
             </a:fld>
             <a:endParaRPr lang="pt-BR"/>
           </a:p>
@@ -2260,7 +2262,7 @@
           <a:p>
             <a:fld id="{E14A8D8A-9BF6-4F09-B8D2-3E331CA72F09}" type="datetimeFigureOut">
               <a:rPr lang="pt-BR" smtClean="0"/>
-              <a:t>21/7/2011</a:t>
+              <a:t>22/7/2011</a:t>
             </a:fld>
             <a:endParaRPr lang="pt-BR"/>
           </a:p>
@@ -2513,7 +2515,7 @@
           <a:p>
             <a:fld id="{E14A8D8A-9BF6-4F09-B8D2-3E331CA72F09}" type="datetimeFigureOut">
               <a:rPr lang="pt-BR" smtClean="0"/>
-              <a:t>21/7/2011</a:t>
+              <a:t>22/7/2011</a:t>
             </a:fld>
             <a:endParaRPr lang="pt-BR"/>
           </a:p>
@@ -2726,7 +2728,7 @@
           <a:p>
             <a:fld id="{E14A8D8A-9BF6-4F09-B8D2-3E331CA72F09}" type="datetimeFigureOut">
               <a:rPr lang="pt-BR" smtClean="0"/>
-              <a:t>21/7/2011</a:t>
+              <a:t>22/7/2011</a:t>
             </a:fld>
             <a:endParaRPr lang="pt-BR"/>
           </a:p>
@@ -6042,22 +6044,1538 @@
         <p:spPr/>
         <p:txBody>
           <a:bodyPr>
-            <a:normAutofit fontScale="90000"/>
+            <a:normAutofit/>
           </a:bodyPr>
           <a:lstStyle/>
           <a:p>
             <a:r>
+              <a:rPr lang="pt-BR" dirty="0" err="1" smtClean="0"/>
+              <a:t>Anáglifos</a:t>
+            </a:r>
+            <a:r>
               <a:rPr lang="pt-BR" dirty="0" smtClean="0"/>
-              <a:t>Conversão com Tabela de Índice de Cores</a:t>
+              <a:t> original e revertido</a:t>
             </a:r>
             <a:endParaRPr lang="pt-BR" dirty="0"/>
           </a:p>
         </p:txBody>
       </p:sp>
+      <p:grpSp>
+        <p:nvGrpSpPr>
+          <p:cNvPr id="5" name="Grupo 4"/>
+          <p:cNvGrpSpPr/>
+          <p:nvPr/>
+        </p:nvGrpSpPr>
+        <p:grpSpPr>
+          <a:xfrm>
+            <a:off x="1691680" y="1484784"/>
+            <a:ext cx="5924550" cy="7642140"/>
+            <a:chOff x="1691680" y="44624"/>
+            <a:chExt cx="5924550" cy="7642140"/>
+          </a:xfrm>
+        </p:grpSpPr>
+        <p:pic>
+          <p:nvPicPr>
+            <p:cNvPr id="1029" name="Picture 5" descr="C:\Documents and Settings\Matheus\Desktop\Mestrado\1-Meus-Artigos\WebMedia11\old01-anaglyph.bmp"/>
+            <p:cNvPicPr>
+              <a:picLocks noChangeAspect="1" noChangeArrowheads="1"/>
+            </p:cNvPicPr>
+            <p:nvPr/>
+          </p:nvPicPr>
+          <p:blipFill>
+            <a:blip r:embed="rId2">
+              <a:extLst>
+                <a:ext uri="{28A0092B-C50C-407E-A947-70E740481C1C}">
+                  <a14:useLocalDpi xmlns:a14="http://schemas.microsoft.com/office/drawing/2010/main" val="0"/>
+                </a:ext>
+              </a:extLst>
+            </a:blip>
+            <a:srcRect/>
+            <a:stretch>
+              <a:fillRect/>
+            </a:stretch>
+          </p:blipFill>
+          <p:spPr bwMode="auto">
+            <a:xfrm>
+              <a:off x="1691680" y="44624"/>
+              <a:ext cx="5924550" cy="3333750"/>
+            </a:xfrm>
+            <a:prstGeom prst="rect">
+              <a:avLst/>
+            </a:prstGeom>
+            <a:noFill/>
+            <a:extLst>
+              <a:ext uri="{909E8E84-426E-40DD-AFC4-6F175D3DCCD1}">
+                <a14:hiddenFill xmlns:a14="http://schemas.microsoft.com/office/drawing/2010/main">
+                  <a:solidFill>
+                    <a:srgbClr val="FFFFFF"/>
+                  </a:solidFill>
+                </a14:hiddenFill>
+              </a:ext>
+            </a:extLst>
+          </p:spPr>
+        </p:pic>
+        <p:pic>
+          <p:nvPicPr>
+            <p:cNvPr id="1030" name="Picture 6" descr="C:\Documents and Settings\Matheus\Desktop\Mestrado\1-Meus-Artigos\WebMedia11\old01-anaglyph-reversed-anaglyph.bmp"/>
+            <p:cNvPicPr>
+              <a:picLocks noChangeAspect="1" noChangeArrowheads="1"/>
+            </p:cNvPicPr>
+            <p:nvPr/>
+          </p:nvPicPr>
+          <p:blipFill>
+            <a:blip r:embed="rId2">
+              <a:extLst>
+                <a:ext uri="{28A0092B-C50C-407E-A947-70E740481C1C}">
+                  <a14:useLocalDpi xmlns:a14="http://schemas.microsoft.com/office/drawing/2010/main" val="0"/>
+                </a:ext>
+              </a:extLst>
+            </a:blip>
+            <a:srcRect/>
+            <a:stretch>
+              <a:fillRect/>
+            </a:stretch>
+          </p:blipFill>
+          <p:spPr bwMode="auto">
+            <a:xfrm>
+              <a:off x="1691680" y="3983682"/>
+              <a:ext cx="5924550" cy="3333750"/>
+            </a:xfrm>
+            <a:prstGeom prst="rect">
+              <a:avLst/>
+            </a:prstGeom>
+            <a:noFill/>
+            <a:extLst>
+              <a:ext uri="{909E8E84-426E-40DD-AFC4-6F175D3DCCD1}">
+                <a14:hiddenFill xmlns:a14="http://schemas.microsoft.com/office/drawing/2010/main">
+                  <a:solidFill>
+                    <a:srgbClr val="FFFFFF"/>
+                  </a:solidFill>
+                </a14:hiddenFill>
+              </a:ext>
+            </a:extLst>
+          </p:spPr>
+        </p:pic>
+        <p:sp>
+          <p:nvSpPr>
+            <p:cNvPr id="3" name="CaixaDeTexto 2"/>
+            <p:cNvSpPr txBox="1"/>
+            <p:nvPr/>
+          </p:nvSpPr>
+          <p:spPr>
+            <a:xfrm>
+              <a:off x="4424565" y="3388350"/>
+              <a:ext cx="458780" cy="369332"/>
+            </a:xfrm>
+            <a:prstGeom prst="rect">
+              <a:avLst/>
+            </a:prstGeom>
+            <a:noFill/>
+          </p:spPr>
+          <p:txBody>
+            <a:bodyPr wrap="none" rtlCol="0">
+              <a:spAutoFit/>
+            </a:bodyPr>
+            <a:lstStyle/>
+            <a:p>
+              <a:r>
+                <a:rPr lang="pt-BR" dirty="0" smtClean="0"/>
+                <a:t>(A)</a:t>
+              </a:r>
+              <a:endParaRPr lang="pt-BR" dirty="0"/>
+            </a:p>
+          </p:txBody>
+        </p:sp>
+        <p:sp>
+          <p:nvSpPr>
+            <p:cNvPr id="9" name="CaixaDeTexto 8"/>
+            <p:cNvSpPr txBox="1"/>
+            <p:nvPr/>
+          </p:nvSpPr>
+          <p:spPr>
+            <a:xfrm>
+              <a:off x="4424565" y="7317432"/>
+              <a:ext cx="450764" cy="369332"/>
+            </a:xfrm>
+            <a:prstGeom prst="rect">
+              <a:avLst/>
+            </a:prstGeom>
+            <a:noFill/>
+          </p:spPr>
+          <p:txBody>
+            <a:bodyPr wrap="none" rtlCol="0">
+              <a:spAutoFit/>
+            </a:bodyPr>
+            <a:lstStyle/>
+            <a:p>
+              <a:r>
+                <a:rPr lang="pt-BR" dirty="0" smtClean="0"/>
+                <a:t>(B)</a:t>
+              </a:r>
+              <a:endParaRPr lang="pt-BR" dirty="0"/>
+            </a:p>
+          </p:txBody>
+        </p:sp>
+      </p:grpSp>
     </p:spTree>
     <p:extLst>
       <p:ext uri="{BB962C8B-B14F-4D97-AF65-F5344CB8AC3E}">
         <p14:creationId xmlns:p14="http://schemas.microsoft.com/office/powerpoint/2010/main" val="2875997953"/>
+      </p:ext>
+    </p:extLst>
+  </p:cSld>
+  <p:clrMapOvr>
+    <a:masterClrMapping/>
+  </p:clrMapOvr>
+</p:sld>
+</file>
+
+<file path=ppt/slides/slide8.xml><?xml version="1.0" encoding="utf-8"?>
+<p:sld xmlns:a="http://schemas.openxmlformats.org/drawingml/2006/main" xmlns:r="http://schemas.openxmlformats.org/officeDocument/2006/relationships" xmlns:p="http://schemas.openxmlformats.org/presentationml/2006/main">
+  <p:cSld>
+    <p:spTree>
+      <p:nvGrpSpPr>
+        <p:cNvPr id="1" name=""/>
+        <p:cNvGrpSpPr/>
+        <p:nvPr/>
+      </p:nvGrpSpPr>
+      <p:grpSpPr>
+        <a:xfrm>
+          <a:off x="0" y="0"/>
+          <a:ext cx="0" cy="0"/>
+          <a:chOff x="0" y="0"/>
+          <a:chExt cx="0" cy="0"/>
+        </a:xfrm>
+      </p:grpSpPr>
+      <p:sp>
+        <p:nvSpPr>
+          <p:cNvPr id="2" name="Título 1"/>
+          <p:cNvSpPr>
+            <a:spLocks noGrp="1"/>
+          </p:cNvSpPr>
+          <p:nvPr>
+            <p:ph type="title"/>
+          </p:nvPr>
+        </p:nvSpPr>
+        <p:spPr/>
+        <p:txBody>
+          <a:bodyPr/>
+          <a:lstStyle/>
+          <a:p>
+            <a:r>
+              <a:rPr lang="pt-BR" dirty="0" smtClean="0"/>
+              <a:t>Par estéreo original e revertido</a:t>
+            </a:r>
+            <a:endParaRPr lang="pt-BR" dirty="0"/>
+          </a:p>
+        </p:txBody>
+      </p:sp>
+      <p:grpSp>
+        <p:nvGrpSpPr>
+          <p:cNvPr id="5" name="Grupo 4"/>
+          <p:cNvGrpSpPr/>
+          <p:nvPr/>
+        </p:nvGrpSpPr>
+        <p:grpSpPr>
+          <a:xfrm>
+            <a:off x="-1692696" y="1196752"/>
+            <a:ext cx="11849100" cy="7570132"/>
+            <a:chOff x="-1692696" y="1196752"/>
+            <a:chExt cx="11849100" cy="7570132"/>
+          </a:xfrm>
+        </p:grpSpPr>
+        <p:pic>
+          <p:nvPicPr>
+            <p:cNvPr id="2050" name="Picture 2" descr="C:\Documents and Settings\Matheus\Desktop\Mestrado\1-Meus-Artigos\WebMedia11\old01.bmp"/>
+            <p:cNvPicPr>
+              <a:picLocks noChangeAspect="1" noChangeArrowheads="1"/>
+            </p:cNvPicPr>
+            <p:nvPr/>
+          </p:nvPicPr>
+          <p:blipFill>
+            <a:blip r:embed="rId2">
+              <a:extLst>
+                <a:ext uri="{28A0092B-C50C-407E-A947-70E740481C1C}">
+                  <a14:useLocalDpi xmlns:a14="http://schemas.microsoft.com/office/drawing/2010/main" val="0"/>
+                </a:ext>
+              </a:extLst>
+            </a:blip>
+            <a:srcRect/>
+            <a:stretch>
+              <a:fillRect/>
+            </a:stretch>
+          </p:blipFill>
+          <p:spPr bwMode="auto">
+            <a:xfrm>
+              <a:off x="-1692696" y="1196752"/>
+              <a:ext cx="11849100" cy="3333750"/>
+            </a:xfrm>
+            <a:prstGeom prst="rect">
+              <a:avLst/>
+            </a:prstGeom>
+            <a:noFill/>
+            <a:extLst>
+              <a:ext uri="{909E8E84-426E-40DD-AFC4-6F175D3DCCD1}">
+                <a14:hiddenFill xmlns:a14="http://schemas.microsoft.com/office/drawing/2010/main">
+                  <a:solidFill>
+                    <a:srgbClr val="FFFFFF"/>
+                  </a:solidFill>
+                </a14:hiddenFill>
+              </a:ext>
+            </a:extLst>
+          </p:spPr>
+        </p:pic>
+        <p:pic>
+          <p:nvPicPr>
+            <p:cNvPr id="2051" name="Picture 3" descr="C:\Documents and Settings\Matheus\Desktop\Mestrado\1-Meus-Artigos\WebMedia11\old01-anaglyph-reversed.bmp"/>
+            <p:cNvPicPr>
+              <a:picLocks noChangeAspect="1" noChangeArrowheads="1"/>
+            </p:cNvPicPr>
+            <p:nvPr/>
+          </p:nvPicPr>
+          <p:blipFill>
+            <a:blip r:embed="rId3">
+              <a:extLst>
+                <a:ext uri="{28A0092B-C50C-407E-A947-70E740481C1C}">
+                  <a14:useLocalDpi xmlns:a14="http://schemas.microsoft.com/office/drawing/2010/main" val="0"/>
+                </a:ext>
+              </a:extLst>
+            </a:blip>
+            <a:srcRect/>
+            <a:stretch>
+              <a:fillRect/>
+            </a:stretch>
+          </p:blipFill>
+          <p:spPr bwMode="auto">
+            <a:xfrm>
+              <a:off x="-1692696" y="5085184"/>
+              <a:ext cx="11849100" cy="3333750"/>
+            </a:xfrm>
+            <a:prstGeom prst="rect">
+              <a:avLst/>
+            </a:prstGeom>
+            <a:noFill/>
+            <a:extLst>
+              <a:ext uri="{909E8E84-426E-40DD-AFC4-6F175D3DCCD1}">
+                <a14:hiddenFill xmlns:a14="http://schemas.microsoft.com/office/drawing/2010/main">
+                  <a:solidFill>
+                    <a:srgbClr val="FFFFFF"/>
+                  </a:solidFill>
+                </a14:hiddenFill>
+              </a:ext>
+            </a:extLst>
+          </p:spPr>
+        </p:pic>
+        <p:sp>
+          <p:nvSpPr>
+            <p:cNvPr id="4" name="CaixaDeTexto 3"/>
+            <p:cNvSpPr txBox="1"/>
+            <p:nvPr/>
+          </p:nvSpPr>
+          <p:spPr>
+            <a:xfrm>
+              <a:off x="4002464" y="4509120"/>
+              <a:ext cx="458780" cy="369332"/>
+            </a:xfrm>
+            <a:prstGeom prst="rect">
+              <a:avLst/>
+            </a:prstGeom>
+            <a:noFill/>
+          </p:spPr>
+          <p:txBody>
+            <a:bodyPr wrap="none" rtlCol="0">
+              <a:spAutoFit/>
+            </a:bodyPr>
+            <a:lstStyle/>
+            <a:p>
+              <a:r>
+                <a:rPr lang="pt-BR" dirty="0" smtClean="0"/>
+                <a:t>(A)</a:t>
+              </a:r>
+              <a:endParaRPr lang="pt-BR" dirty="0"/>
+            </a:p>
+          </p:txBody>
+        </p:sp>
+        <p:sp>
+          <p:nvSpPr>
+            <p:cNvPr id="7" name="CaixaDeTexto 6"/>
+            <p:cNvSpPr txBox="1"/>
+            <p:nvPr/>
+          </p:nvSpPr>
+          <p:spPr>
+            <a:xfrm>
+              <a:off x="4002464" y="8397552"/>
+              <a:ext cx="450764" cy="369332"/>
+            </a:xfrm>
+            <a:prstGeom prst="rect">
+              <a:avLst/>
+            </a:prstGeom>
+            <a:noFill/>
+          </p:spPr>
+          <p:txBody>
+            <a:bodyPr wrap="none" rtlCol="0">
+              <a:spAutoFit/>
+            </a:bodyPr>
+            <a:lstStyle/>
+            <a:p>
+              <a:r>
+                <a:rPr lang="pt-BR" dirty="0" smtClean="0"/>
+                <a:t>(B)</a:t>
+              </a:r>
+              <a:endParaRPr lang="pt-BR" dirty="0"/>
+            </a:p>
+          </p:txBody>
+        </p:sp>
+      </p:grpSp>
+    </p:spTree>
+    <p:extLst>
+      <p:ext uri="{BB962C8B-B14F-4D97-AF65-F5344CB8AC3E}">
+        <p14:creationId xmlns:p14="http://schemas.microsoft.com/office/powerpoint/2010/main" val="1555048651"/>
+      </p:ext>
+    </p:extLst>
+  </p:cSld>
+  <p:clrMapOvr>
+    <a:masterClrMapping/>
+  </p:clrMapOvr>
+</p:sld>
+</file>
+
+<file path=ppt/slides/slide9.xml><?xml version="1.0" encoding="utf-8"?>
+<p:sld xmlns:a="http://schemas.openxmlformats.org/drawingml/2006/main" xmlns:r="http://schemas.openxmlformats.org/officeDocument/2006/relationships" xmlns:p="http://schemas.openxmlformats.org/presentationml/2006/main">
+  <p:cSld>
+    <p:spTree>
+      <p:nvGrpSpPr>
+        <p:cNvPr id="1" name=""/>
+        <p:cNvGrpSpPr/>
+        <p:nvPr/>
+      </p:nvGrpSpPr>
+      <p:grpSpPr>
+        <a:xfrm>
+          <a:off x="0" y="0"/>
+          <a:ext cx="0" cy="0"/>
+          <a:chOff x="0" y="0"/>
+          <a:chExt cx="0" cy="0"/>
+        </a:xfrm>
+      </p:grpSpPr>
+      <p:sp>
+        <p:nvSpPr>
+          <p:cNvPr id="2" name="Título 1"/>
+          <p:cNvSpPr>
+            <a:spLocks noGrp="1"/>
+          </p:cNvSpPr>
+          <p:nvPr>
+            <p:ph type="title"/>
+          </p:nvPr>
+        </p:nvSpPr>
+        <p:spPr/>
+        <p:txBody>
+          <a:bodyPr/>
+          <a:lstStyle/>
+          <a:p>
+            <a:r>
+              <a:rPr lang="pt-BR" dirty="0" smtClean="0"/>
+              <a:t>DSCQS</a:t>
+            </a:r>
+            <a:endParaRPr lang="pt-BR" dirty="0"/>
+          </a:p>
+        </p:txBody>
+      </p:sp>
+      <p:grpSp>
+        <p:nvGrpSpPr>
+          <p:cNvPr id="22" name="Grupo 21"/>
+          <p:cNvGrpSpPr/>
+          <p:nvPr/>
+        </p:nvGrpSpPr>
+        <p:grpSpPr>
+          <a:xfrm>
+            <a:off x="755576" y="2781300"/>
+            <a:ext cx="7605796" cy="1727820"/>
+            <a:chOff x="755576" y="2781300"/>
+            <a:chExt cx="7605796" cy="1727820"/>
+          </a:xfrm>
+        </p:grpSpPr>
+        <p:pic>
+          <p:nvPicPr>
+            <p:cNvPr id="3074" name="Picture 2"/>
+            <p:cNvPicPr>
+              <a:picLocks noChangeAspect="1" noChangeArrowheads="1"/>
+            </p:cNvPicPr>
+            <p:nvPr/>
+          </p:nvPicPr>
+          <p:blipFill>
+            <a:blip r:embed="rId2">
+              <a:extLst>
+                <a:ext uri="{BEBA8EAE-BF5A-486C-A8C5-ECC9F3942E4B}">
+                  <a14:imgProps xmlns:a14="http://schemas.microsoft.com/office/drawing/2010/main">
+                    <a14:imgLayer r:embed="rId3">
+                      <a14:imgEffect>
+                        <a14:sharpenSoften amount="25000"/>
+                      </a14:imgEffect>
+                    </a14:imgLayer>
+                  </a14:imgProps>
+                </a:ext>
+                <a:ext uri="{28A0092B-C50C-407E-A947-70E740481C1C}">
+                  <a14:useLocalDpi xmlns:a14="http://schemas.microsoft.com/office/drawing/2010/main" val="0"/>
+                </a:ext>
+              </a:extLst>
+            </a:blip>
+            <a:srcRect/>
+            <a:stretch>
+              <a:fillRect/>
+            </a:stretch>
+          </p:blipFill>
+          <p:spPr bwMode="auto">
+            <a:xfrm>
+              <a:off x="755576" y="2781300"/>
+              <a:ext cx="7605796" cy="1727820"/>
+            </a:xfrm>
+            <a:prstGeom prst="rect">
+              <a:avLst/>
+            </a:prstGeom>
+            <a:noFill/>
+            <a:ln>
+              <a:noFill/>
+            </a:ln>
+            <a:effectLst/>
+            <a:extLst>
+              <a:ext uri="{909E8E84-426E-40DD-AFC4-6F175D3DCCD1}">
+                <a14:hiddenFill xmlns:a14="http://schemas.microsoft.com/office/drawing/2010/main">
+                  <a:solidFill>
+                    <a:schemeClr val="accent1"/>
+                  </a:solidFill>
+                </a14:hiddenFill>
+              </a:ext>
+              <a:ext uri="{91240B29-F687-4F45-9708-019B960494DF}">
+                <a14:hiddenLine xmlns:a14="http://schemas.microsoft.com/office/drawing/2010/main" w="9525">
+                  <a:solidFill>
+                    <a:schemeClr val="tx1"/>
+                  </a:solidFill>
+                  <a:miter lim="800000"/>
+                  <a:headEnd/>
+                  <a:tailEnd/>
+                </a14:hiddenLine>
+              </a:ext>
+              <a:ext uri="{AF507438-7753-43E0-B8FC-AC1667EBCBE1}">
+                <a14:hiddenEffects xmlns:a14="http://schemas.microsoft.com/office/drawing/2010/main">
+                  <a:effectLst>
+                    <a:outerShdw dist="35921" dir="2700000" algn="ctr" rotWithShape="0">
+                      <a:schemeClr val="bg2"/>
+                    </a:outerShdw>
+                  </a:effectLst>
+                </a14:hiddenEffects>
+              </a:ext>
+            </a:extLst>
+          </p:spPr>
+        </p:pic>
+        <p:sp>
+          <p:nvSpPr>
+            <p:cNvPr id="5" name="Retângulo 4"/>
+            <p:cNvSpPr/>
+            <p:nvPr/>
+          </p:nvSpPr>
+          <p:spPr>
+            <a:xfrm>
+              <a:off x="1043608" y="2960948"/>
+              <a:ext cx="879260" cy="1116124"/>
+            </a:xfrm>
+            <a:prstGeom prst="rect">
+              <a:avLst/>
+            </a:prstGeom>
+            <a:solidFill>
+              <a:schemeClr val="bg1"/>
+            </a:solidFill>
+            <a:ln>
+              <a:solidFill>
+                <a:schemeClr val="bg1"/>
+              </a:solidFill>
+            </a:ln>
+          </p:spPr>
+          <p:style>
+            <a:lnRef idx="2">
+              <a:schemeClr val="accent1">
+                <a:shade val="50000"/>
+              </a:schemeClr>
+            </a:lnRef>
+            <a:fillRef idx="1">
+              <a:schemeClr val="accent1"/>
+            </a:fillRef>
+            <a:effectRef idx="0">
+              <a:schemeClr val="accent1"/>
+            </a:effectRef>
+            <a:fontRef idx="minor">
+              <a:schemeClr val="lt1"/>
+            </a:fontRef>
+          </p:style>
+          <p:txBody>
+            <a:bodyPr rtlCol="0" anchor="ctr"/>
+            <a:lstStyle/>
+            <a:p>
+              <a:pPr algn="ctr"/>
+              <a:r>
+                <a:rPr lang="pt-BR" dirty="0" smtClean="0"/>
+                <a:t>A</a:t>
+              </a:r>
+              <a:endParaRPr lang="pt-BR" dirty="0"/>
+            </a:p>
+          </p:txBody>
+        </p:sp>
+        <p:sp>
+          <p:nvSpPr>
+            <p:cNvPr id="7" name="Retângulo 6"/>
+            <p:cNvSpPr/>
+            <p:nvPr/>
+          </p:nvSpPr>
+          <p:spPr>
+            <a:xfrm>
+              <a:off x="2987824" y="2960948"/>
+              <a:ext cx="879260" cy="1260140"/>
+            </a:xfrm>
+            <a:prstGeom prst="rect">
+              <a:avLst/>
+            </a:prstGeom>
+            <a:solidFill>
+              <a:schemeClr val="bg1"/>
+            </a:solidFill>
+            <a:ln>
+              <a:solidFill>
+                <a:schemeClr val="bg1"/>
+              </a:solidFill>
+            </a:ln>
+          </p:spPr>
+          <p:style>
+            <a:lnRef idx="2">
+              <a:schemeClr val="accent1">
+                <a:shade val="50000"/>
+              </a:schemeClr>
+            </a:lnRef>
+            <a:fillRef idx="1">
+              <a:schemeClr val="accent1"/>
+            </a:fillRef>
+            <a:effectRef idx="0">
+              <a:schemeClr val="accent1"/>
+            </a:effectRef>
+            <a:fontRef idx="minor">
+              <a:schemeClr val="lt1"/>
+            </a:fontRef>
+          </p:style>
+          <p:txBody>
+            <a:bodyPr rtlCol="0" anchor="ctr"/>
+            <a:lstStyle/>
+            <a:p>
+              <a:pPr algn="ctr"/>
+              <a:endParaRPr lang="pt-BR"/>
+            </a:p>
+          </p:txBody>
+        </p:sp>
+        <p:sp>
+          <p:nvSpPr>
+            <p:cNvPr id="8" name="Retângulo 7"/>
+            <p:cNvSpPr/>
+            <p:nvPr/>
+          </p:nvSpPr>
+          <p:spPr>
+            <a:xfrm>
+              <a:off x="4716016" y="2960948"/>
+              <a:ext cx="879260" cy="1116124"/>
+            </a:xfrm>
+            <a:prstGeom prst="rect">
+              <a:avLst/>
+            </a:prstGeom>
+            <a:solidFill>
+              <a:schemeClr val="bg1"/>
+            </a:solidFill>
+            <a:ln>
+              <a:solidFill>
+                <a:schemeClr val="bg1"/>
+              </a:solidFill>
+            </a:ln>
+          </p:spPr>
+          <p:style>
+            <a:lnRef idx="2">
+              <a:schemeClr val="accent1">
+                <a:shade val="50000"/>
+              </a:schemeClr>
+            </a:lnRef>
+            <a:fillRef idx="1">
+              <a:schemeClr val="accent1"/>
+            </a:fillRef>
+            <a:effectRef idx="0">
+              <a:schemeClr val="accent1"/>
+            </a:effectRef>
+            <a:fontRef idx="minor">
+              <a:schemeClr val="lt1"/>
+            </a:fontRef>
+          </p:style>
+          <p:txBody>
+            <a:bodyPr rtlCol="0" anchor="ctr"/>
+            <a:lstStyle/>
+            <a:p>
+              <a:pPr algn="ctr"/>
+              <a:endParaRPr lang="pt-BR"/>
+            </a:p>
+          </p:txBody>
+        </p:sp>
+        <p:sp>
+          <p:nvSpPr>
+            <p:cNvPr id="9" name="Retângulo 8"/>
+            <p:cNvSpPr/>
+            <p:nvPr/>
+          </p:nvSpPr>
+          <p:spPr>
+            <a:xfrm>
+              <a:off x="6588224" y="2960948"/>
+              <a:ext cx="879260" cy="1260140"/>
+            </a:xfrm>
+            <a:prstGeom prst="rect">
+              <a:avLst/>
+            </a:prstGeom>
+            <a:solidFill>
+              <a:schemeClr val="bg1"/>
+            </a:solidFill>
+            <a:ln>
+              <a:solidFill>
+                <a:schemeClr val="bg1"/>
+              </a:solidFill>
+            </a:ln>
+          </p:spPr>
+          <p:style>
+            <a:lnRef idx="2">
+              <a:schemeClr val="accent1">
+                <a:shade val="50000"/>
+              </a:schemeClr>
+            </a:lnRef>
+            <a:fillRef idx="1">
+              <a:schemeClr val="accent1"/>
+            </a:fillRef>
+            <a:effectRef idx="0">
+              <a:schemeClr val="accent1"/>
+            </a:effectRef>
+            <a:fontRef idx="minor">
+              <a:schemeClr val="lt1"/>
+            </a:fontRef>
+          </p:style>
+          <p:txBody>
+            <a:bodyPr rtlCol="0" anchor="ctr"/>
+            <a:lstStyle/>
+            <a:p>
+              <a:pPr algn="ctr"/>
+              <a:endParaRPr lang="pt-BR"/>
+            </a:p>
+          </p:txBody>
+        </p:sp>
+        <p:sp>
+          <p:nvSpPr>
+            <p:cNvPr id="4" name="CaixaDeTexto 3"/>
+            <p:cNvSpPr txBox="1"/>
+            <p:nvPr/>
+          </p:nvSpPr>
+          <p:spPr>
+            <a:xfrm>
+              <a:off x="1007604" y="3284984"/>
+              <a:ext cx="951268" cy="461665"/>
+            </a:xfrm>
+            <a:prstGeom prst="rect">
+              <a:avLst/>
+            </a:prstGeom>
+            <a:solidFill>
+              <a:schemeClr val="bg1"/>
+            </a:solidFill>
+          </p:spPr>
+          <p:txBody>
+            <a:bodyPr wrap="square" rtlCol="0">
+              <a:spAutoFit/>
+            </a:bodyPr>
+            <a:lstStyle/>
+            <a:p>
+              <a:pPr algn="ctr"/>
+              <a:r>
+                <a:rPr lang="pt-BR" sz="1200" dirty="0" smtClean="0"/>
+                <a:t>Original ou processado</a:t>
+              </a:r>
+              <a:endParaRPr lang="pt-BR" sz="1200" dirty="0"/>
+            </a:p>
+          </p:txBody>
+        </p:sp>
+        <p:sp>
+          <p:nvSpPr>
+            <p:cNvPr id="10" name="CaixaDeTexto 9"/>
+            <p:cNvSpPr txBox="1"/>
+            <p:nvPr/>
+          </p:nvSpPr>
+          <p:spPr>
+            <a:xfrm>
+              <a:off x="2828644" y="3284984"/>
+              <a:ext cx="951268" cy="461665"/>
+            </a:xfrm>
+            <a:prstGeom prst="rect">
+              <a:avLst/>
+            </a:prstGeom>
+            <a:solidFill>
+              <a:schemeClr val="bg1"/>
+            </a:solidFill>
+          </p:spPr>
+          <p:txBody>
+            <a:bodyPr wrap="square" rtlCol="0">
+              <a:spAutoFit/>
+            </a:bodyPr>
+            <a:lstStyle/>
+            <a:p>
+              <a:pPr algn="ctr"/>
+              <a:r>
+                <a:rPr lang="pt-BR" sz="1200" dirty="0" smtClean="0"/>
+                <a:t>Original ou processado</a:t>
+              </a:r>
+              <a:endParaRPr lang="pt-BR" sz="1200" dirty="0"/>
+            </a:p>
+          </p:txBody>
+        </p:sp>
+        <p:sp>
+          <p:nvSpPr>
+            <p:cNvPr id="11" name="CaixaDeTexto 10"/>
+            <p:cNvSpPr txBox="1"/>
+            <p:nvPr/>
+          </p:nvSpPr>
+          <p:spPr>
+            <a:xfrm>
+              <a:off x="4724896" y="3284984"/>
+              <a:ext cx="951268" cy="461665"/>
+            </a:xfrm>
+            <a:prstGeom prst="rect">
+              <a:avLst/>
+            </a:prstGeom>
+            <a:solidFill>
+              <a:schemeClr val="bg1"/>
+            </a:solidFill>
+          </p:spPr>
+          <p:txBody>
+            <a:bodyPr wrap="square" rtlCol="0">
+              <a:spAutoFit/>
+            </a:bodyPr>
+            <a:lstStyle/>
+            <a:p>
+              <a:pPr algn="ctr"/>
+              <a:r>
+                <a:rPr lang="pt-BR" sz="1200" dirty="0" smtClean="0"/>
+                <a:t>Original ou processado</a:t>
+              </a:r>
+              <a:endParaRPr lang="pt-BR" sz="1200" dirty="0"/>
+            </a:p>
+          </p:txBody>
+        </p:sp>
+        <p:sp>
+          <p:nvSpPr>
+            <p:cNvPr id="12" name="CaixaDeTexto 11"/>
+            <p:cNvSpPr txBox="1"/>
+            <p:nvPr/>
+          </p:nvSpPr>
+          <p:spPr>
+            <a:xfrm>
+              <a:off x="6588224" y="3284984"/>
+              <a:ext cx="951268" cy="461665"/>
+            </a:xfrm>
+            <a:prstGeom prst="rect">
+              <a:avLst/>
+            </a:prstGeom>
+            <a:solidFill>
+              <a:schemeClr val="bg1"/>
+            </a:solidFill>
+          </p:spPr>
+          <p:txBody>
+            <a:bodyPr wrap="square" rtlCol="0">
+              <a:spAutoFit/>
+            </a:bodyPr>
+            <a:lstStyle/>
+            <a:p>
+              <a:pPr algn="ctr"/>
+              <a:r>
+                <a:rPr lang="pt-BR" sz="1200" dirty="0" smtClean="0"/>
+                <a:t>Original ou processado</a:t>
+              </a:r>
+              <a:endParaRPr lang="pt-BR" sz="1200" dirty="0"/>
+            </a:p>
+          </p:txBody>
+        </p:sp>
+        <p:sp>
+          <p:nvSpPr>
+            <p:cNvPr id="6" name="Retângulo 5"/>
+            <p:cNvSpPr/>
+            <p:nvPr/>
+          </p:nvSpPr>
+          <p:spPr>
+            <a:xfrm>
+              <a:off x="2195736" y="2924944"/>
+              <a:ext cx="432048" cy="1152128"/>
+            </a:xfrm>
+            <a:prstGeom prst="rect">
+              <a:avLst/>
+            </a:prstGeom>
+            <a:solidFill>
+              <a:schemeClr val="bg1"/>
+            </a:solidFill>
+            <a:ln>
+              <a:solidFill>
+                <a:schemeClr val="bg1"/>
+              </a:solidFill>
+            </a:ln>
+          </p:spPr>
+          <p:style>
+            <a:lnRef idx="2">
+              <a:schemeClr val="accent1">
+                <a:shade val="50000"/>
+              </a:schemeClr>
+            </a:lnRef>
+            <a:fillRef idx="1">
+              <a:schemeClr val="accent1"/>
+            </a:fillRef>
+            <a:effectRef idx="0">
+              <a:schemeClr val="accent1"/>
+            </a:effectRef>
+            <a:fontRef idx="minor">
+              <a:schemeClr val="lt1"/>
+            </a:fontRef>
+          </p:style>
+          <p:txBody>
+            <a:bodyPr rtlCol="0" anchor="ctr"/>
+            <a:lstStyle/>
+            <a:p>
+              <a:pPr algn="ctr"/>
+              <a:endParaRPr lang="pt-BR"/>
+            </a:p>
+          </p:txBody>
+        </p:sp>
+        <p:sp>
+          <p:nvSpPr>
+            <p:cNvPr id="14" name="Retângulo 13"/>
+            <p:cNvSpPr/>
+            <p:nvPr/>
+          </p:nvSpPr>
+          <p:spPr>
+            <a:xfrm>
+              <a:off x="3995936" y="2960948"/>
+              <a:ext cx="432048" cy="1116124"/>
+            </a:xfrm>
+            <a:prstGeom prst="rect">
+              <a:avLst/>
+            </a:prstGeom>
+            <a:solidFill>
+              <a:schemeClr val="bg1"/>
+            </a:solidFill>
+            <a:ln>
+              <a:solidFill>
+                <a:schemeClr val="bg1"/>
+              </a:solidFill>
+            </a:ln>
+          </p:spPr>
+          <p:style>
+            <a:lnRef idx="2">
+              <a:schemeClr val="accent1">
+                <a:shade val="50000"/>
+              </a:schemeClr>
+            </a:lnRef>
+            <a:fillRef idx="1">
+              <a:schemeClr val="accent1"/>
+            </a:fillRef>
+            <a:effectRef idx="0">
+              <a:schemeClr val="accent1"/>
+            </a:effectRef>
+            <a:fontRef idx="minor">
+              <a:schemeClr val="lt1"/>
+            </a:fontRef>
+          </p:style>
+          <p:txBody>
+            <a:bodyPr rtlCol="0" anchor="ctr"/>
+            <a:lstStyle/>
+            <a:p>
+              <a:pPr algn="ctr"/>
+              <a:endParaRPr lang="pt-BR"/>
+            </a:p>
+          </p:txBody>
+        </p:sp>
+        <p:sp>
+          <p:nvSpPr>
+            <p:cNvPr id="15" name="Retângulo 14"/>
+            <p:cNvSpPr/>
+            <p:nvPr/>
+          </p:nvSpPr>
+          <p:spPr>
+            <a:xfrm>
+              <a:off x="5940152" y="2924944"/>
+              <a:ext cx="432048" cy="1152128"/>
+            </a:xfrm>
+            <a:prstGeom prst="rect">
+              <a:avLst/>
+            </a:prstGeom>
+            <a:solidFill>
+              <a:schemeClr val="bg1"/>
+            </a:solidFill>
+            <a:ln>
+              <a:solidFill>
+                <a:schemeClr val="bg1"/>
+              </a:solidFill>
+            </a:ln>
+          </p:spPr>
+          <p:style>
+            <a:lnRef idx="2">
+              <a:schemeClr val="accent1">
+                <a:shade val="50000"/>
+              </a:schemeClr>
+            </a:lnRef>
+            <a:fillRef idx="1">
+              <a:schemeClr val="accent1"/>
+            </a:fillRef>
+            <a:effectRef idx="0">
+              <a:schemeClr val="accent1"/>
+            </a:effectRef>
+            <a:fontRef idx="minor">
+              <a:schemeClr val="lt1"/>
+            </a:fontRef>
+          </p:style>
+          <p:txBody>
+            <a:bodyPr rtlCol="0" anchor="ctr"/>
+            <a:lstStyle/>
+            <a:p>
+              <a:pPr algn="ctr"/>
+              <a:endParaRPr lang="pt-BR"/>
+            </a:p>
+          </p:txBody>
+        </p:sp>
+        <p:sp>
+          <p:nvSpPr>
+            <p:cNvPr id="16" name="Retângulo 15"/>
+            <p:cNvSpPr/>
+            <p:nvPr/>
+          </p:nvSpPr>
+          <p:spPr>
+            <a:xfrm>
+              <a:off x="7740352" y="2917252"/>
+              <a:ext cx="432048" cy="1159819"/>
+            </a:xfrm>
+            <a:prstGeom prst="rect">
+              <a:avLst/>
+            </a:prstGeom>
+            <a:solidFill>
+              <a:schemeClr val="bg1"/>
+            </a:solidFill>
+            <a:ln>
+              <a:solidFill>
+                <a:schemeClr val="bg1"/>
+              </a:solidFill>
+            </a:ln>
+          </p:spPr>
+          <p:style>
+            <a:lnRef idx="2">
+              <a:schemeClr val="accent1">
+                <a:shade val="50000"/>
+              </a:schemeClr>
+            </a:lnRef>
+            <a:fillRef idx="1">
+              <a:schemeClr val="accent1"/>
+            </a:fillRef>
+            <a:effectRef idx="0">
+              <a:schemeClr val="accent1"/>
+            </a:effectRef>
+            <a:fontRef idx="minor">
+              <a:schemeClr val="lt1"/>
+            </a:fontRef>
+          </p:style>
+          <p:txBody>
+            <a:bodyPr rtlCol="0" anchor="ctr"/>
+            <a:lstStyle/>
+            <a:p>
+              <a:pPr algn="ctr"/>
+              <a:endParaRPr lang="pt-BR"/>
+            </a:p>
+          </p:txBody>
+        </p:sp>
+        <p:sp>
+          <p:nvSpPr>
+            <p:cNvPr id="13" name="CaixaDeTexto 12"/>
+            <p:cNvSpPr txBox="1"/>
+            <p:nvPr/>
+          </p:nvSpPr>
+          <p:spPr>
+            <a:xfrm>
+              <a:off x="2123728" y="2910135"/>
+              <a:ext cx="576064" cy="461665"/>
+            </a:xfrm>
+            <a:prstGeom prst="rect">
+              <a:avLst/>
+            </a:prstGeom>
+            <a:noFill/>
+          </p:spPr>
+          <p:txBody>
+            <a:bodyPr wrap="square" rtlCol="0">
+              <a:spAutoFit/>
+            </a:bodyPr>
+            <a:lstStyle/>
+            <a:p>
+              <a:pPr algn="ctr"/>
+              <a:r>
+                <a:rPr lang="pt-BR" sz="1200" dirty="0" smtClean="0"/>
+                <a:t>Tela Cinza</a:t>
+              </a:r>
+              <a:endParaRPr lang="pt-BR" sz="1200" dirty="0"/>
+            </a:p>
+          </p:txBody>
+        </p:sp>
+        <p:sp>
+          <p:nvSpPr>
+            <p:cNvPr id="18" name="CaixaDeTexto 17"/>
+            <p:cNvSpPr txBox="1"/>
+            <p:nvPr/>
+          </p:nvSpPr>
+          <p:spPr>
+            <a:xfrm>
+              <a:off x="3982410" y="2910135"/>
+              <a:ext cx="576064" cy="461665"/>
+            </a:xfrm>
+            <a:prstGeom prst="rect">
+              <a:avLst/>
+            </a:prstGeom>
+            <a:noFill/>
+          </p:spPr>
+          <p:txBody>
+            <a:bodyPr wrap="square" rtlCol="0">
+              <a:spAutoFit/>
+            </a:bodyPr>
+            <a:lstStyle/>
+            <a:p>
+              <a:pPr algn="ctr"/>
+              <a:r>
+                <a:rPr lang="pt-BR" sz="1200" dirty="0" smtClean="0"/>
+                <a:t>Tela Cinza</a:t>
+              </a:r>
+              <a:endParaRPr lang="pt-BR" sz="1200" dirty="0"/>
+            </a:p>
+          </p:txBody>
+        </p:sp>
+        <p:sp>
+          <p:nvSpPr>
+            <p:cNvPr id="19" name="CaixaDeTexto 18"/>
+            <p:cNvSpPr txBox="1"/>
+            <p:nvPr/>
+          </p:nvSpPr>
+          <p:spPr>
+            <a:xfrm>
+              <a:off x="5833081" y="2874131"/>
+              <a:ext cx="576064" cy="461665"/>
+            </a:xfrm>
+            <a:prstGeom prst="rect">
+              <a:avLst/>
+            </a:prstGeom>
+            <a:noFill/>
+          </p:spPr>
+          <p:txBody>
+            <a:bodyPr wrap="square" rtlCol="0">
+              <a:spAutoFit/>
+            </a:bodyPr>
+            <a:lstStyle/>
+            <a:p>
+              <a:pPr algn="ctr"/>
+              <a:r>
+                <a:rPr lang="pt-BR" sz="1200" dirty="0" smtClean="0"/>
+                <a:t>Tela Cinza</a:t>
+              </a:r>
+              <a:endParaRPr lang="pt-BR" sz="1200" dirty="0"/>
+            </a:p>
+          </p:txBody>
+        </p:sp>
+        <p:sp>
+          <p:nvSpPr>
+            <p:cNvPr id="20" name="CaixaDeTexto 19"/>
+            <p:cNvSpPr txBox="1"/>
+            <p:nvPr/>
+          </p:nvSpPr>
+          <p:spPr>
+            <a:xfrm>
+              <a:off x="7668344" y="2874131"/>
+              <a:ext cx="576064" cy="461665"/>
+            </a:xfrm>
+            <a:prstGeom prst="rect">
+              <a:avLst/>
+            </a:prstGeom>
+            <a:noFill/>
+          </p:spPr>
+          <p:txBody>
+            <a:bodyPr wrap="square" rtlCol="0">
+              <a:spAutoFit/>
+            </a:bodyPr>
+            <a:lstStyle/>
+            <a:p>
+              <a:pPr algn="ctr"/>
+              <a:r>
+                <a:rPr lang="pt-BR" sz="1200" dirty="0" smtClean="0"/>
+                <a:t>Tela Cinza</a:t>
+              </a:r>
+              <a:endParaRPr lang="pt-BR" sz="1200" dirty="0"/>
+            </a:p>
+          </p:txBody>
+        </p:sp>
+        <p:sp>
+          <p:nvSpPr>
+            <p:cNvPr id="21" name="CaixaDeTexto 20"/>
+            <p:cNvSpPr txBox="1"/>
+            <p:nvPr/>
+          </p:nvSpPr>
+          <p:spPr>
+            <a:xfrm>
+              <a:off x="1324380" y="2956301"/>
+              <a:ext cx="303288" cy="338554"/>
+            </a:xfrm>
+            <a:prstGeom prst="rect">
+              <a:avLst/>
+            </a:prstGeom>
+            <a:noFill/>
+          </p:spPr>
+          <p:txBody>
+            <a:bodyPr wrap="none" rtlCol="0">
+              <a:spAutoFit/>
+            </a:bodyPr>
+            <a:lstStyle/>
+            <a:p>
+              <a:r>
+                <a:rPr lang="pt-BR" sz="1600" dirty="0" smtClean="0"/>
+                <a:t>A</a:t>
+              </a:r>
+              <a:endParaRPr lang="pt-BR" sz="1600" dirty="0"/>
+            </a:p>
+          </p:txBody>
+        </p:sp>
+        <p:sp>
+          <p:nvSpPr>
+            <p:cNvPr id="23" name="CaixaDeTexto 22"/>
+            <p:cNvSpPr txBox="1"/>
+            <p:nvPr/>
+          </p:nvSpPr>
+          <p:spPr>
+            <a:xfrm>
+              <a:off x="3188592" y="2946430"/>
+              <a:ext cx="296876" cy="338554"/>
+            </a:xfrm>
+            <a:prstGeom prst="rect">
+              <a:avLst/>
+            </a:prstGeom>
+            <a:noFill/>
+          </p:spPr>
+          <p:txBody>
+            <a:bodyPr wrap="none" rtlCol="0">
+              <a:spAutoFit/>
+            </a:bodyPr>
+            <a:lstStyle/>
+            <a:p>
+              <a:r>
+                <a:rPr lang="pt-BR" sz="1600" dirty="0" smtClean="0"/>
+                <a:t>B</a:t>
+              </a:r>
+              <a:endParaRPr lang="pt-BR" sz="1600" dirty="0"/>
+            </a:p>
+          </p:txBody>
+        </p:sp>
+        <p:sp>
+          <p:nvSpPr>
+            <p:cNvPr id="24" name="CaixaDeTexto 23"/>
+            <p:cNvSpPr txBox="1"/>
+            <p:nvPr/>
+          </p:nvSpPr>
+          <p:spPr>
+            <a:xfrm>
+              <a:off x="5075208" y="2971690"/>
+              <a:ext cx="303288" cy="338554"/>
+            </a:xfrm>
+            <a:prstGeom prst="rect">
+              <a:avLst/>
+            </a:prstGeom>
+            <a:noFill/>
+          </p:spPr>
+          <p:txBody>
+            <a:bodyPr wrap="none" rtlCol="0">
+              <a:spAutoFit/>
+            </a:bodyPr>
+            <a:lstStyle/>
+            <a:p>
+              <a:r>
+                <a:rPr lang="pt-BR" sz="1600" dirty="0" smtClean="0"/>
+                <a:t>A</a:t>
+              </a:r>
+              <a:endParaRPr lang="pt-BR" sz="1600" dirty="0"/>
+            </a:p>
+          </p:txBody>
+        </p:sp>
+        <p:sp>
+          <p:nvSpPr>
+            <p:cNvPr id="25" name="CaixaDeTexto 24"/>
+            <p:cNvSpPr txBox="1"/>
+            <p:nvPr/>
+          </p:nvSpPr>
+          <p:spPr>
+            <a:xfrm>
+              <a:off x="6939420" y="2961819"/>
+              <a:ext cx="296876" cy="338554"/>
+            </a:xfrm>
+            <a:prstGeom prst="rect">
+              <a:avLst/>
+            </a:prstGeom>
+            <a:noFill/>
+          </p:spPr>
+          <p:txBody>
+            <a:bodyPr wrap="none" rtlCol="0">
+              <a:spAutoFit/>
+            </a:bodyPr>
+            <a:lstStyle/>
+            <a:p>
+              <a:r>
+                <a:rPr lang="pt-BR" sz="1600" dirty="0" smtClean="0"/>
+                <a:t>B</a:t>
+              </a:r>
+              <a:endParaRPr lang="pt-BR" sz="1600" dirty="0"/>
+            </a:p>
+          </p:txBody>
+        </p:sp>
+        <p:sp>
+          <p:nvSpPr>
+            <p:cNvPr id="26" name="CaixaDeTexto 25"/>
+            <p:cNvSpPr txBox="1"/>
+            <p:nvPr/>
+          </p:nvSpPr>
+          <p:spPr>
+            <a:xfrm>
+              <a:off x="1331594" y="3882534"/>
+              <a:ext cx="386644" cy="307777"/>
+            </a:xfrm>
+            <a:prstGeom prst="rect">
+              <a:avLst/>
+            </a:prstGeom>
+            <a:noFill/>
+          </p:spPr>
+          <p:txBody>
+            <a:bodyPr wrap="none" rtlCol="0">
+              <a:spAutoFit/>
+            </a:bodyPr>
+            <a:lstStyle/>
+            <a:p>
+              <a:r>
+                <a:rPr lang="pt-BR" sz="1400" dirty="0" smtClean="0"/>
+                <a:t>8 s</a:t>
+              </a:r>
+              <a:endParaRPr lang="pt-BR" sz="1400" dirty="0"/>
+            </a:p>
+          </p:txBody>
+        </p:sp>
+        <p:sp>
+          <p:nvSpPr>
+            <p:cNvPr id="27" name="CaixaDeTexto 26"/>
+            <p:cNvSpPr txBox="1"/>
+            <p:nvPr/>
+          </p:nvSpPr>
+          <p:spPr>
+            <a:xfrm>
+              <a:off x="2195736" y="3882534"/>
+              <a:ext cx="386644" cy="307777"/>
+            </a:xfrm>
+            <a:prstGeom prst="rect">
+              <a:avLst/>
+            </a:prstGeom>
+            <a:noFill/>
+          </p:spPr>
+          <p:txBody>
+            <a:bodyPr wrap="none" rtlCol="0">
+              <a:spAutoFit/>
+            </a:bodyPr>
+            <a:lstStyle/>
+            <a:p>
+              <a:r>
+                <a:rPr lang="pt-BR" sz="1400" dirty="0" smtClean="0"/>
+                <a:t>2 s</a:t>
+              </a:r>
+              <a:endParaRPr lang="pt-BR" sz="1400" dirty="0"/>
+            </a:p>
+          </p:txBody>
+        </p:sp>
+        <p:sp>
+          <p:nvSpPr>
+            <p:cNvPr id="28" name="CaixaDeTexto 27"/>
+            <p:cNvSpPr txBox="1"/>
+            <p:nvPr/>
+          </p:nvSpPr>
+          <p:spPr>
+            <a:xfrm>
+              <a:off x="3131840" y="3882533"/>
+              <a:ext cx="386644" cy="307777"/>
+            </a:xfrm>
+            <a:prstGeom prst="rect">
+              <a:avLst/>
+            </a:prstGeom>
+            <a:noFill/>
+          </p:spPr>
+          <p:txBody>
+            <a:bodyPr wrap="none" rtlCol="0">
+              <a:spAutoFit/>
+            </a:bodyPr>
+            <a:lstStyle/>
+            <a:p>
+              <a:r>
+                <a:rPr lang="pt-BR" sz="1400" dirty="0" smtClean="0"/>
+                <a:t>8 s</a:t>
+              </a:r>
+              <a:endParaRPr lang="pt-BR" sz="1400" dirty="0"/>
+            </a:p>
+          </p:txBody>
+        </p:sp>
+        <p:sp>
+          <p:nvSpPr>
+            <p:cNvPr id="29" name="CaixaDeTexto 28"/>
+            <p:cNvSpPr txBox="1"/>
+            <p:nvPr/>
+          </p:nvSpPr>
+          <p:spPr>
+            <a:xfrm>
+              <a:off x="4041340" y="3882533"/>
+              <a:ext cx="386644" cy="307777"/>
+            </a:xfrm>
+            <a:prstGeom prst="rect">
+              <a:avLst/>
+            </a:prstGeom>
+            <a:noFill/>
+          </p:spPr>
+          <p:txBody>
+            <a:bodyPr wrap="none" rtlCol="0">
+              <a:spAutoFit/>
+            </a:bodyPr>
+            <a:lstStyle/>
+            <a:p>
+              <a:r>
+                <a:rPr lang="pt-BR" sz="1400" dirty="0" smtClean="0"/>
+                <a:t>2 s</a:t>
+              </a:r>
+              <a:endParaRPr lang="pt-BR" sz="1400" dirty="0"/>
+            </a:p>
+          </p:txBody>
+        </p:sp>
+        <p:sp>
+          <p:nvSpPr>
+            <p:cNvPr id="30" name="CaixaDeTexto 29"/>
+            <p:cNvSpPr txBox="1"/>
+            <p:nvPr/>
+          </p:nvSpPr>
+          <p:spPr>
+            <a:xfrm>
+              <a:off x="5007208" y="3882532"/>
+              <a:ext cx="386644" cy="307777"/>
+            </a:xfrm>
+            <a:prstGeom prst="rect">
+              <a:avLst/>
+            </a:prstGeom>
+            <a:noFill/>
+          </p:spPr>
+          <p:txBody>
+            <a:bodyPr wrap="none" rtlCol="0">
+              <a:spAutoFit/>
+            </a:bodyPr>
+            <a:lstStyle/>
+            <a:p>
+              <a:r>
+                <a:rPr lang="pt-BR" sz="1400" dirty="0" smtClean="0"/>
+                <a:t>8 s</a:t>
+              </a:r>
+              <a:endParaRPr lang="pt-BR" sz="1400" dirty="0"/>
+            </a:p>
+          </p:txBody>
+        </p:sp>
+        <p:sp>
+          <p:nvSpPr>
+            <p:cNvPr id="31" name="CaixaDeTexto 30"/>
+            <p:cNvSpPr txBox="1"/>
+            <p:nvPr/>
+          </p:nvSpPr>
+          <p:spPr>
+            <a:xfrm>
+              <a:off x="5916708" y="3882532"/>
+              <a:ext cx="386644" cy="307777"/>
+            </a:xfrm>
+            <a:prstGeom prst="rect">
+              <a:avLst/>
+            </a:prstGeom>
+            <a:noFill/>
+          </p:spPr>
+          <p:txBody>
+            <a:bodyPr wrap="none" rtlCol="0">
+              <a:spAutoFit/>
+            </a:bodyPr>
+            <a:lstStyle/>
+            <a:p>
+              <a:r>
+                <a:rPr lang="pt-BR" sz="1400" dirty="0" smtClean="0"/>
+                <a:t>2 s</a:t>
+              </a:r>
+              <a:endParaRPr lang="pt-BR" sz="1400" dirty="0"/>
+            </a:p>
+          </p:txBody>
+        </p:sp>
+        <p:sp>
+          <p:nvSpPr>
+            <p:cNvPr id="32" name="CaixaDeTexto 31"/>
+            <p:cNvSpPr txBox="1"/>
+            <p:nvPr/>
+          </p:nvSpPr>
+          <p:spPr>
+            <a:xfrm>
+              <a:off x="6876256" y="3882531"/>
+              <a:ext cx="386644" cy="307777"/>
+            </a:xfrm>
+            <a:prstGeom prst="rect">
+              <a:avLst/>
+            </a:prstGeom>
+            <a:noFill/>
+          </p:spPr>
+          <p:txBody>
+            <a:bodyPr wrap="none" rtlCol="0">
+              <a:spAutoFit/>
+            </a:bodyPr>
+            <a:lstStyle/>
+            <a:p>
+              <a:r>
+                <a:rPr lang="pt-BR" sz="1400" dirty="0" smtClean="0"/>
+                <a:t>8 s</a:t>
+              </a:r>
+              <a:endParaRPr lang="pt-BR" sz="1400" dirty="0"/>
+            </a:p>
+          </p:txBody>
+        </p:sp>
+        <p:sp>
+          <p:nvSpPr>
+            <p:cNvPr id="33" name="CaixaDeTexto 32"/>
+            <p:cNvSpPr txBox="1"/>
+            <p:nvPr/>
+          </p:nvSpPr>
+          <p:spPr>
+            <a:xfrm>
+              <a:off x="7785756" y="3882531"/>
+              <a:ext cx="386644" cy="307777"/>
+            </a:xfrm>
+            <a:prstGeom prst="rect">
+              <a:avLst/>
+            </a:prstGeom>
+            <a:noFill/>
+          </p:spPr>
+          <p:txBody>
+            <a:bodyPr wrap="none" rtlCol="0">
+              <a:spAutoFit/>
+            </a:bodyPr>
+            <a:lstStyle/>
+            <a:p>
+              <a:r>
+                <a:rPr lang="pt-BR" sz="1400" dirty="0" smtClean="0"/>
+                <a:t>6 s</a:t>
+              </a:r>
+              <a:endParaRPr lang="pt-BR" sz="1400" dirty="0"/>
+            </a:p>
+          </p:txBody>
+        </p:sp>
+      </p:grpSp>
+    </p:spTree>
+    <p:extLst>
+      <p:ext uri="{BB962C8B-B14F-4D97-AF65-F5344CB8AC3E}">
+        <p14:creationId xmlns:p14="http://schemas.microsoft.com/office/powerpoint/2010/main" val="240158127"/>
       </p:ext>
     </p:extLst>
   </p:cSld>

</xml_diff>

<commit_message>
Mestrado - versão finalizada da quali no padrão ABNT enviada para revisão ao professor - adicionada imagem sobre mapa de profundidades no arquivo de imagens da quali
</commit_message>
<xml_diff>
--- a/Imagens/imagens-quali.pptx
+++ b/Imagens/imagens-quali.pptx
@@ -11,9 +11,10 @@
     <p:sldId id="260" r:id="rId5"/>
     <p:sldId id="261" r:id="rId6"/>
     <p:sldId id="262" r:id="rId7"/>
-    <p:sldId id="263" r:id="rId8"/>
-    <p:sldId id="264" r:id="rId9"/>
-    <p:sldId id="265" r:id="rId10"/>
+    <p:sldId id="266" r:id="rId8"/>
+    <p:sldId id="263" r:id="rId9"/>
+    <p:sldId id="264" r:id="rId10"/>
+    <p:sldId id="265" r:id="rId11"/>
   </p:sldIdLst>
   <p:sldSz cx="9144000" cy="6858000" type="screen4x3"/>
   <p:notesSz cx="6858000" cy="9144000"/>
@@ -296,7 +297,7 @@
           <a:p>
             <a:fld id="{E14A8D8A-9BF6-4F09-B8D2-3E331CA72F09}" type="datetimeFigureOut">
               <a:rPr lang="pt-BR" smtClean="0"/>
-              <a:t>22/7/2011</a:t>
+              <a:t>28/7/2011</a:t>
             </a:fld>
             <a:endParaRPr lang="pt-BR"/>
           </a:p>
@@ -466,7 +467,7 @@
           <a:p>
             <a:fld id="{E14A8D8A-9BF6-4F09-B8D2-3E331CA72F09}" type="datetimeFigureOut">
               <a:rPr lang="pt-BR" smtClean="0"/>
-              <a:t>22/7/2011</a:t>
+              <a:t>28/7/2011</a:t>
             </a:fld>
             <a:endParaRPr lang="pt-BR"/>
           </a:p>
@@ -646,7 +647,7 @@
           <a:p>
             <a:fld id="{E14A8D8A-9BF6-4F09-B8D2-3E331CA72F09}" type="datetimeFigureOut">
               <a:rPr lang="pt-BR" smtClean="0"/>
-              <a:t>22/7/2011</a:t>
+              <a:t>28/7/2011</a:t>
             </a:fld>
             <a:endParaRPr lang="pt-BR"/>
           </a:p>
@@ -816,7 +817,7 @@
           <a:p>
             <a:fld id="{E14A8D8A-9BF6-4F09-B8D2-3E331CA72F09}" type="datetimeFigureOut">
               <a:rPr lang="pt-BR" smtClean="0"/>
-              <a:t>22/7/2011</a:t>
+              <a:t>28/7/2011</a:t>
             </a:fld>
             <a:endParaRPr lang="pt-BR"/>
           </a:p>
@@ -1062,7 +1063,7 @@
           <a:p>
             <a:fld id="{E14A8D8A-9BF6-4F09-B8D2-3E331CA72F09}" type="datetimeFigureOut">
               <a:rPr lang="pt-BR" smtClean="0"/>
-              <a:t>22/7/2011</a:t>
+              <a:t>28/7/2011</a:t>
             </a:fld>
             <a:endParaRPr lang="pt-BR"/>
           </a:p>
@@ -1350,7 +1351,7 @@
           <a:p>
             <a:fld id="{E14A8D8A-9BF6-4F09-B8D2-3E331CA72F09}" type="datetimeFigureOut">
               <a:rPr lang="pt-BR" smtClean="0"/>
-              <a:t>22/7/2011</a:t>
+              <a:t>28/7/2011</a:t>
             </a:fld>
             <a:endParaRPr lang="pt-BR"/>
           </a:p>
@@ -1772,7 +1773,7 @@
           <a:p>
             <a:fld id="{E14A8D8A-9BF6-4F09-B8D2-3E331CA72F09}" type="datetimeFigureOut">
               <a:rPr lang="pt-BR" smtClean="0"/>
-              <a:t>22/7/2011</a:t>
+              <a:t>28/7/2011</a:t>
             </a:fld>
             <a:endParaRPr lang="pt-BR"/>
           </a:p>
@@ -1890,7 +1891,7 @@
           <a:p>
             <a:fld id="{E14A8D8A-9BF6-4F09-B8D2-3E331CA72F09}" type="datetimeFigureOut">
               <a:rPr lang="pt-BR" smtClean="0"/>
-              <a:t>22/7/2011</a:t>
+              <a:t>28/7/2011</a:t>
             </a:fld>
             <a:endParaRPr lang="pt-BR"/>
           </a:p>
@@ -1985,7 +1986,7 @@
           <a:p>
             <a:fld id="{E14A8D8A-9BF6-4F09-B8D2-3E331CA72F09}" type="datetimeFigureOut">
               <a:rPr lang="pt-BR" smtClean="0"/>
-              <a:t>22/7/2011</a:t>
+              <a:t>28/7/2011</a:t>
             </a:fld>
             <a:endParaRPr lang="pt-BR"/>
           </a:p>
@@ -2262,7 +2263,7 @@
           <a:p>
             <a:fld id="{E14A8D8A-9BF6-4F09-B8D2-3E331CA72F09}" type="datetimeFigureOut">
               <a:rPr lang="pt-BR" smtClean="0"/>
-              <a:t>22/7/2011</a:t>
+              <a:t>28/7/2011</a:t>
             </a:fld>
             <a:endParaRPr lang="pt-BR"/>
           </a:p>
@@ -2515,7 +2516,7 @@
           <a:p>
             <a:fld id="{E14A8D8A-9BF6-4F09-B8D2-3E331CA72F09}" type="datetimeFigureOut">
               <a:rPr lang="pt-BR" smtClean="0"/>
-              <a:t>22/7/2011</a:t>
+              <a:t>28/7/2011</a:t>
             </a:fld>
             <a:endParaRPr lang="pt-BR"/>
           </a:p>
@@ -2728,7 +2729,7 @@
           <a:p>
             <a:fld id="{E14A8D8A-9BF6-4F09-B8D2-3E331CA72F09}" type="datetimeFigureOut">
               <a:rPr lang="pt-BR" smtClean="0"/>
-              <a:t>22/7/2011</a:t>
+              <a:t>28/7/2011</a:t>
             </a:fld>
             <a:endParaRPr lang="pt-BR"/>
           </a:p>
@@ -3157,6 +3158,1151 @@
     <p:extLst>
       <p:ext uri="{BB962C8B-B14F-4D97-AF65-F5344CB8AC3E}">
         <p14:creationId xmlns:p14="http://schemas.microsoft.com/office/powerpoint/2010/main" val="600681620"/>
+      </p:ext>
+    </p:extLst>
+  </p:cSld>
+  <p:clrMapOvr>
+    <a:masterClrMapping/>
+  </p:clrMapOvr>
+</p:sld>
+</file>
+
+<file path=ppt/slides/slide10.xml><?xml version="1.0" encoding="utf-8"?>
+<p:sld xmlns:a="http://schemas.openxmlformats.org/drawingml/2006/main" xmlns:r="http://schemas.openxmlformats.org/officeDocument/2006/relationships" xmlns:p="http://schemas.openxmlformats.org/presentationml/2006/main">
+  <p:cSld>
+    <p:spTree>
+      <p:nvGrpSpPr>
+        <p:cNvPr id="1" name=""/>
+        <p:cNvGrpSpPr/>
+        <p:nvPr/>
+      </p:nvGrpSpPr>
+      <p:grpSpPr>
+        <a:xfrm>
+          <a:off x="0" y="0"/>
+          <a:ext cx="0" cy="0"/>
+          <a:chOff x="0" y="0"/>
+          <a:chExt cx="0" cy="0"/>
+        </a:xfrm>
+      </p:grpSpPr>
+      <p:sp>
+        <p:nvSpPr>
+          <p:cNvPr id="2" name="Título 1"/>
+          <p:cNvSpPr>
+            <a:spLocks noGrp="1"/>
+          </p:cNvSpPr>
+          <p:nvPr>
+            <p:ph type="title"/>
+          </p:nvPr>
+        </p:nvSpPr>
+        <p:spPr/>
+        <p:txBody>
+          <a:bodyPr/>
+          <a:lstStyle/>
+          <a:p>
+            <a:r>
+              <a:rPr lang="pt-BR" dirty="0" smtClean="0"/>
+              <a:t>DSCQS</a:t>
+            </a:r>
+            <a:endParaRPr lang="pt-BR" dirty="0"/>
+          </a:p>
+        </p:txBody>
+      </p:sp>
+      <p:grpSp>
+        <p:nvGrpSpPr>
+          <p:cNvPr id="22" name="Grupo 21"/>
+          <p:cNvGrpSpPr/>
+          <p:nvPr/>
+        </p:nvGrpSpPr>
+        <p:grpSpPr>
+          <a:xfrm>
+            <a:off x="755576" y="2781300"/>
+            <a:ext cx="7605796" cy="1727820"/>
+            <a:chOff x="755576" y="2781300"/>
+            <a:chExt cx="7605796" cy="1727820"/>
+          </a:xfrm>
+        </p:grpSpPr>
+        <p:pic>
+          <p:nvPicPr>
+            <p:cNvPr id="3074" name="Picture 2"/>
+            <p:cNvPicPr>
+              <a:picLocks noChangeAspect="1" noChangeArrowheads="1"/>
+            </p:cNvPicPr>
+            <p:nvPr/>
+          </p:nvPicPr>
+          <p:blipFill>
+            <a:blip r:embed="rId2">
+              <a:extLst>
+                <a:ext uri="{BEBA8EAE-BF5A-486C-A8C5-ECC9F3942E4B}">
+                  <a14:imgProps xmlns:a14="http://schemas.microsoft.com/office/drawing/2010/main">
+                    <a14:imgLayer r:embed="rId3">
+                      <a14:imgEffect>
+                        <a14:sharpenSoften amount="25000"/>
+                      </a14:imgEffect>
+                    </a14:imgLayer>
+                  </a14:imgProps>
+                </a:ext>
+                <a:ext uri="{28A0092B-C50C-407E-A947-70E740481C1C}">
+                  <a14:useLocalDpi xmlns:a14="http://schemas.microsoft.com/office/drawing/2010/main" val="0"/>
+                </a:ext>
+              </a:extLst>
+            </a:blip>
+            <a:srcRect/>
+            <a:stretch>
+              <a:fillRect/>
+            </a:stretch>
+          </p:blipFill>
+          <p:spPr bwMode="auto">
+            <a:xfrm>
+              <a:off x="755576" y="2781300"/>
+              <a:ext cx="7605796" cy="1727820"/>
+            </a:xfrm>
+            <a:prstGeom prst="rect">
+              <a:avLst/>
+            </a:prstGeom>
+            <a:noFill/>
+            <a:ln>
+              <a:noFill/>
+            </a:ln>
+            <a:effectLst/>
+            <a:extLst>
+              <a:ext uri="{909E8E84-426E-40DD-AFC4-6F175D3DCCD1}">
+                <a14:hiddenFill xmlns:a14="http://schemas.microsoft.com/office/drawing/2010/main">
+                  <a:solidFill>
+                    <a:schemeClr val="accent1"/>
+                  </a:solidFill>
+                </a14:hiddenFill>
+              </a:ext>
+              <a:ext uri="{91240B29-F687-4F45-9708-019B960494DF}">
+                <a14:hiddenLine xmlns:a14="http://schemas.microsoft.com/office/drawing/2010/main" w="9525">
+                  <a:solidFill>
+                    <a:schemeClr val="tx1"/>
+                  </a:solidFill>
+                  <a:miter lim="800000"/>
+                  <a:headEnd/>
+                  <a:tailEnd/>
+                </a14:hiddenLine>
+              </a:ext>
+              <a:ext uri="{AF507438-7753-43E0-B8FC-AC1667EBCBE1}">
+                <a14:hiddenEffects xmlns:a14="http://schemas.microsoft.com/office/drawing/2010/main">
+                  <a:effectLst>
+                    <a:outerShdw dist="35921" dir="2700000" algn="ctr" rotWithShape="0">
+                      <a:schemeClr val="bg2"/>
+                    </a:outerShdw>
+                  </a:effectLst>
+                </a14:hiddenEffects>
+              </a:ext>
+            </a:extLst>
+          </p:spPr>
+        </p:pic>
+        <p:sp>
+          <p:nvSpPr>
+            <p:cNvPr id="5" name="Retângulo 4"/>
+            <p:cNvSpPr/>
+            <p:nvPr/>
+          </p:nvSpPr>
+          <p:spPr>
+            <a:xfrm>
+              <a:off x="1043608" y="2960948"/>
+              <a:ext cx="879260" cy="1116124"/>
+            </a:xfrm>
+            <a:prstGeom prst="rect">
+              <a:avLst/>
+            </a:prstGeom>
+            <a:solidFill>
+              <a:schemeClr val="bg1"/>
+            </a:solidFill>
+            <a:ln>
+              <a:solidFill>
+                <a:schemeClr val="bg1"/>
+              </a:solidFill>
+            </a:ln>
+          </p:spPr>
+          <p:style>
+            <a:lnRef idx="2">
+              <a:schemeClr val="accent1">
+                <a:shade val="50000"/>
+              </a:schemeClr>
+            </a:lnRef>
+            <a:fillRef idx="1">
+              <a:schemeClr val="accent1"/>
+            </a:fillRef>
+            <a:effectRef idx="0">
+              <a:schemeClr val="accent1"/>
+            </a:effectRef>
+            <a:fontRef idx="minor">
+              <a:schemeClr val="lt1"/>
+            </a:fontRef>
+          </p:style>
+          <p:txBody>
+            <a:bodyPr rtlCol="0" anchor="ctr"/>
+            <a:lstStyle/>
+            <a:p>
+              <a:pPr algn="ctr"/>
+              <a:r>
+                <a:rPr lang="pt-BR" dirty="0" smtClean="0"/>
+                <a:t>A</a:t>
+              </a:r>
+              <a:endParaRPr lang="pt-BR" dirty="0"/>
+            </a:p>
+          </p:txBody>
+        </p:sp>
+        <p:sp>
+          <p:nvSpPr>
+            <p:cNvPr id="7" name="Retângulo 6"/>
+            <p:cNvSpPr/>
+            <p:nvPr/>
+          </p:nvSpPr>
+          <p:spPr>
+            <a:xfrm>
+              <a:off x="2987824" y="2960948"/>
+              <a:ext cx="879260" cy="1260140"/>
+            </a:xfrm>
+            <a:prstGeom prst="rect">
+              <a:avLst/>
+            </a:prstGeom>
+            <a:solidFill>
+              <a:schemeClr val="bg1"/>
+            </a:solidFill>
+            <a:ln>
+              <a:solidFill>
+                <a:schemeClr val="bg1"/>
+              </a:solidFill>
+            </a:ln>
+          </p:spPr>
+          <p:style>
+            <a:lnRef idx="2">
+              <a:schemeClr val="accent1">
+                <a:shade val="50000"/>
+              </a:schemeClr>
+            </a:lnRef>
+            <a:fillRef idx="1">
+              <a:schemeClr val="accent1"/>
+            </a:fillRef>
+            <a:effectRef idx="0">
+              <a:schemeClr val="accent1"/>
+            </a:effectRef>
+            <a:fontRef idx="minor">
+              <a:schemeClr val="lt1"/>
+            </a:fontRef>
+          </p:style>
+          <p:txBody>
+            <a:bodyPr rtlCol="0" anchor="ctr"/>
+            <a:lstStyle/>
+            <a:p>
+              <a:pPr algn="ctr"/>
+              <a:endParaRPr lang="pt-BR"/>
+            </a:p>
+          </p:txBody>
+        </p:sp>
+        <p:sp>
+          <p:nvSpPr>
+            <p:cNvPr id="8" name="Retângulo 7"/>
+            <p:cNvSpPr/>
+            <p:nvPr/>
+          </p:nvSpPr>
+          <p:spPr>
+            <a:xfrm>
+              <a:off x="4716016" y="2960948"/>
+              <a:ext cx="879260" cy="1116124"/>
+            </a:xfrm>
+            <a:prstGeom prst="rect">
+              <a:avLst/>
+            </a:prstGeom>
+            <a:solidFill>
+              <a:schemeClr val="bg1"/>
+            </a:solidFill>
+            <a:ln>
+              <a:solidFill>
+                <a:schemeClr val="bg1"/>
+              </a:solidFill>
+            </a:ln>
+          </p:spPr>
+          <p:style>
+            <a:lnRef idx="2">
+              <a:schemeClr val="accent1">
+                <a:shade val="50000"/>
+              </a:schemeClr>
+            </a:lnRef>
+            <a:fillRef idx="1">
+              <a:schemeClr val="accent1"/>
+            </a:fillRef>
+            <a:effectRef idx="0">
+              <a:schemeClr val="accent1"/>
+            </a:effectRef>
+            <a:fontRef idx="minor">
+              <a:schemeClr val="lt1"/>
+            </a:fontRef>
+          </p:style>
+          <p:txBody>
+            <a:bodyPr rtlCol="0" anchor="ctr"/>
+            <a:lstStyle/>
+            <a:p>
+              <a:pPr algn="ctr"/>
+              <a:endParaRPr lang="pt-BR"/>
+            </a:p>
+          </p:txBody>
+        </p:sp>
+        <p:sp>
+          <p:nvSpPr>
+            <p:cNvPr id="9" name="Retângulo 8"/>
+            <p:cNvSpPr/>
+            <p:nvPr/>
+          </p:nvSpPr>
+          <p:spPr>
+            <a:xfrm>
+              <a:off x="6588224" y="2960948"/>
+              <a:ext cx="879260" cy="1260140"/>
+            </a:xfrm>
+            <a:prstGeom prst="rect">
+              <a:avLst/>
+            </a:prstGeom>
+            <a:solidFill>
+              <a:schemeClr val="bg1"/>
+            </a:solidFill>
+            <a:ln>
+              <a:solidFill>
+                <a:schemeClr val="bg1"/>
+              </a:solidFill>
+            </a:ln>
+          </p:spPr>
+          <p:style>
+            <a:lnRef idx="2">
+              <a:schemeClr val="accent1">
+                <a:shade val="50000"/>
+              </a:schemeClr>
+            </a:lnRef>
+            <a:fillRef idx="1">
+              <a:schemeClr val="accent1"/>
+            </a:fillRef>
+            <a:effectRef idx="0">
+              <a:schemeClr val="accent1"/>
+            </a:effectRef>
+            <a:fontRef idx="minor">
+              <a:schemeClr val="lt1"/>
+            </a:fontRef>
+          </p:style>
+          <p:txBody>
+            <a:bodyPr rtlCol="0" anchor="ctr"/>
+            <a:lstStyle/>
+            <a:p>
+              <a:pPr algn="ctr"/>
+              <a:endParaRPr lang="pt-BR"/>
+            </a:p>
+          </p:txBody>
+        </p:sp>
+        <p:sp>
+          <p:nvSpPr>
+            <p:cNvPr id="4" name="CaixaDeTexto 3"/>
+            <p:cNvSpPr txBox="1"/>
+            <p:nvPr/>
+          </p:nvSpPr>
+          <p:spPr>
+            <a:xfrm>
+              <a:off x="1007604" y="3284984"/>
+              <a:ext cx="951268" cy="461665"/>
+            </a:xfrm>
+            <a:prstGeom prst="rect">
+              <a:avLst/>
+            </a:prstGeom>
+            <a:solidFill>
+              <a:schemeClr val="bg1"/>
+            </a:solidFill>
+          </p:spPr>
+          <p:txBody>
+            <a:bodyPr wrap="square" rtlCol="0">
+              <a:spAutoFit/>
+            </a:bodyPr>
+            <a:lstStyle/>
+            <a:p>
+              <a:pPr algn="ctr"/>
+              <a:r>
+                <a:rPr lang="pt-BR" sz="1200" dirty="0" smtClean="0"/>
+                <a:t>Original ou processado</a:t>
+              </a:r>
+              <a:endParaRPr lang="pt-BR" sz="1200" dirty="0"/>
+            </a:p>
+          </p:txBody>
+        </p:sp>
+        <p:sp>
+          <p:nvSpPr>
+            <p:cNvPr id="10" name="CaixaDeTexto 9"/>
+            <p:cNvSpPr txBox="1"/>
+            <p:nvPr/>
+          </p:nvSpPr>
+          <p:spPr>
+            <a:xfrm>
+              <a:off x="2828644" y="3284984"/>
+              <a:ext cx="951268" cy="461665"/>
+            </a:xfrm>
+            <a:prstGeom prst="rect">
+              <a:avLst/>
+            </a:prstGeom>
+            <a:solidFill>
+              <a:schemeClr val="bg1"/>
+            </a:solidFill>
+          </p:spPr>
+          <p:txBody>
+            <a:bodyPr wrap="square" rtlCol="0">
+              <a:spAutoFit/>
+            </a:bodyPr>
+            <a:lstStyle/>
+            <a:p>
+              <a:pPr algn="ctr"/>
+              <a:r>
+                <a:rPr lang="pt-BR" sz="1200" dirty="0" smtClean="0"/>
+                <a:t>Original ou processado</a:t>
+              </a:r>
+              <a:endParaRPr lang="pt-BR" sz="1200" dirty="0"/>
+            </a:p>
+          </p:txBody>
+        </p:sp>
+        <p:sp>
+          <p:nvSpPr>
+            <p:cNvPr id="11" name="CaixaDeTexto 10"/>
+            <p:cNvSpPr txBox="1"/>
+            <p:nvPr/>
+          </p:nvSpPr>
+          <p:spPr>
+            <a:xfrm>
+              <a:off x="4724896" y="3284984"/>
+              <a:ext cx="951268" cy="461665"/>
+            </a:xfrm>
+            <a:prstGeom prst="rect">
+              <a:avLst/>
+            </a:prstGeom>
+            <a:solidFill>
+              <a:schemeClr val="bg1"/>
+            </a:solidFill>
+          </p:spPr>
+          <p:txBody>
+            <a:bodyPr wrap="square" rtlCol="0">
+              <a:spAutoFit/>
+            </a:bodyPr>
+            <a:lstStyle/>
+            <a:p>
+              <a:pPr algn="ctr"/>
+              <a:r>
+                <a:rPr lang="pt-BR" sz="1200" dirty="0" smtClean="0"/>
+                <a:t>Original ou processado</a:t>
+              </a:r>
+              <a:endParaRPr lang="pt-BR" sz="1200" dirty="0"/>
+            </a:p>
+          </p:txBody>
+        </p:sp>
+        <p:sp>
+          <p:nvSpPr>
+            <p:cNvPr id="12" name="CaixaDeTexto 11"/>
+            <p:cNvSpPr txBox="1"/>
+            <p:nvPr/>
+          </p:nvSpPr>
+          <p:spPr>
+            <a:xfrm>
+              <a:off x="6588224" y="3284984"/>
+              <a:ext cx="951268" cy="461665"/>
+            </a:xfrm>
+            <a:prstGeom prst="rect">
+              <a:avLst/>
+            </a:prstGeom>
+            <a:solidFill>
+              <a:schemeClr val="bg1"/>
+            </a:solidFill>
+          </p:spPr>
+          <p:txBody>
+            <a:bodyPr wrap="square" rtlCol="0">
+              <a:spAutoFit/>
+            </a:bodyPr>
+            <a:lstStyle/>
+            <a:p>
+              <a:pPr algn="ctr"/>
+              <a:r>
+                <a:rPr lang="pt-BR" sz="1200" dirty="0" smtClean="0"/>
+                <a:t>Original ou processado</a:t>
+              </a:r>
+              <a:endParaRPr lang="pt-BR" sz="1200" dirty="0"/>
+            </a:p>
+          </p:txBody>
+        </p:sp>
+        <p:sp>
+          <p:nvSpPr>
+            <p:cNvPr id="6" name="Retângulo 5"/>
+            <p:cNvSpPr/>
+            <p:nvPr/>
+          </p:nvSpPr>
+          <p:spPr>
+            <a:xfrm>
+              <a:off x="2195736" y="2924944"/>
+              <a:ext cx="432048" cy="1152128"/>
+            </a:xfrm>
+            <a:prstGeom prst="rect">
+              <a:avLst/>
+            </a:prstGeom>
+            <a:solidFill>
+              <a:schemeClr val="bg1"/>
+            </a:solidFill>
+            <a:ln>
+              <a:solidFill>
+                <a:schemeClr val="bg1"/>
+              </a:solidFill>
+            </a:ln>
+          </p:spPr>
+          <p:style>
+            <a:lnRef idx="2">
+              <a:schemeClr val="accent1">
+                <a:shade val="50000"/>
+              </a:schemeClr>
+            </a:lnRef>
+            <a:fillRef idx="1">
+              <a:schemeClr val="accent1"/>
+            </a:fillRef>
+            <a:effectRef idx="0">
+              <a:schemeClr val="accent1"/>
+            </a:effectRef>
+            <a:fontRef idx="minor">
+              <a:schemeClr val="lt1"/>
+            </a:fontRef>
+          </p:style>
+          <p:txBody>
+            <a:bodyPr rtlCol="0" anchor="ctr"/>
+            <a:lstStyle/>
+            <a:p>
+              <a:pPr algn="ctr"/>
+              <a:endParaRPr lang="pt-BR"/>
+            </a:p>
+          </p:txBody>
+        </p:sp>
+        <p:sp>
+          <p:nvSpPr>
+            <p:cNvPr id="14" name="Retângulo 13"/>
+            <p:cNvSpPr/>
+            <p:nvPr/>
+          </p:nvSpPr>
+          <p:spPr>
+            <a:xfrm>
+              <a:off x="3995936" y="2960948"/>
+              <a:ext cx="432048" cy="1116124"/>
+            </a:xfrm>
+            <a:prstGeom prst="rect">
+              <a:avLst/>
+            </a:prstGeom>
+            <a:solidFill>
+              <a:schemeClr val="bg1"/>
+            </a:solidFill>
+            <a:ln>
+              <a:solidFill>
+                <a:schemeClr val="bg1"/>
+              </a:solidFill>
+            </a:ln>
+          </p:spPr>
+          <p:style>
+            <a:lnRef idx="2">
+              <a:schemeClr val="accent1">
+                <a:shade val="50000"/>
+              </a:schemeClr>
+            </a:lnRef>
+            <a:fillRef idx="1">
+              <a:schemeClr val="accent1"/>
+            </a:fillRef>
+            <a:effectRef idx="0">
+              <a:schemeClr val="accent1"/>
+            </a:effectRef>
+            <a:fontRef idx="minor">
+              <a:schemeClr val="lt1"/>
+            </a:fontRef>
+          </p:style>
+          <p:txBody>
+            <a:bodyPr rtlCol="0" anchor="ctr"/>
+            <a:lstStyle/>
+            <a:p>
+              <a:pPr algn="ctr"/>
+              <a:endParaRPr lang="pt-BR"/>
+            </a:p>
+          </p:txBody>
+        </p:sp>
+        <p:sp>
+          <p:nvSpPr>
+            <p:cNvPr id="15" name="Retângulo 14"/>
+            <p:cNvSpPr/>
+            <p:nvPr/>
+          </p:nvSpPr>
+          <p:spPr>
+            <a:xfrm>
+              <a:off x="5940152" y="2924944"/>
+              <a:ext cx="432048" cy="1152128"/>
+            </a:xfrm>
+            <a:prstGeom prst="rect">
+              <a:avLst/>
+            </a:prstGeom>
+            <a:solidFill>
+              <a:schemeClr val="bg1"/>
+            </a:solidFill>
+            <a:ln>
+              <a:solidFill>
+                <a:schemeClr val="bg1"/>
+              </a:solidFill>
+            </a:ln>
+          </p:spPr>
+          <p:style>
+            <a:lnRef idx="2">
+              <a:schemeClr val="accent1">
+                <a:shade val="50000"/>
+              </a:schemeClr>
+            </a:lnRef>
+            <a:fillRef idx="1">
+              <a:schemeClr val="accent1"/>
+            </a:fillRef>
+            <a:effectRef idx="0">
+              <a:schemeClr val="accent1"/>
+            </a:effectRef>
+            <a:fontRef idx="minor">
+              <a:schemeClr val="lt1"/>
+            </a:fontRef>
+          </p:style>
+          <p:txBody>
+            <a:bodyPr rtlCol="0" anchor="ctr"/>
+            <a:lstStyle/>
+            <a:p>
+              <a:pPr algn="ctr"/>
+              <a:endParaRPr lang="pt-BR"/>
+            </a:p>
+          </p:txBody>
+        </p:sp>
+        <p:sp>
+          <p:nvSpPr>
+            <p:cNvPr id="16" name="Retângulo 15"/>
+            <p:cNvSpPr/>
+            <p:nvPr/>
+          </p:nvSpPr>
+          <p:spPr>
+            <a:xfrm>
+              <a:off x="7740352" y="2917252"/>
+              <a:ext cx="432048" cy="1159819"/>
+            </a:xfrm>
+            <a:prstGeom prst="rect">
+              <a:avLst/>
+            </a:prstGeom>
+            <a:solidFill>
+              <a:schemeClr val="bg1"/>
+            </a:solidFill>
+            <a:ln>
+              <a:solidFill>
+                <a:schemeClr val="bg1"/>
+              </a:solidFill>
+            </a:ln>
+          </p:spPr>
+          <p:style>
+            <a:lnRef idx="2">
+              <a:schemeClr val="accent1">
+                <a:shade val="50000"/>
+              </a:schemeClr>
+            </a:lnRef>
+            <a:fillRef idx="1">
+              <a:schemeClr val="accent1"/>
+            </a:fillRef>
+            <a:effectRef idx="0">
+              <a:schemeClr val="accent1"/>
+            </a:effectRef>
+            <a:fontRef idx="minor">
+              <a:schemeClr val="lt1"/>
+            </a:fontRef>
+          </p:style>
+          <p:txBody>
+            <a:bodyPr rtlCol="0" anchor="ctr"/>
+            <a:lstStyle/>
+            <a:p>
+              <a:pPr algn="ctr"/>
+              <a:endParaRPr lang="pt-BR"/>
+            </a:p>
+          </p:txBody>
+        </p:sp>
+        <p:sp>
+          <p:nvSpPr>
+            <p:cNvPr id="13" name="CaixaDeTexto 12"/>
+            <p:cNvSpPr txBox="1"/>
+            <p:nvPr/>
+          </p:nvSpPr>
+          <p:spPr>
+            <a:xfrm>
+              <a:off x="2123728" y="2910135"/>
+              <a:ext cx="576064" cy="461665"/>
+            </a:xfrm>
+            <a:prstGeom prst="rect">
+              <a:avLst/>
+            </a:prstGeom>
+            <a:noFill/>
+          </p:spPr>
+          <p:txBody>
+            <a:bodyPr wrap="square" rtlCol="0">
+              <a:spAutoFit/>
+            </a:bodyPr>
+            <a:lstStyle/>
+            <a:p>
+              <a:pPr algn="ctr"/>
+              <a:r>
+                <a:rPr lang="pt-BR" sz="1200" dirty="0" smtClean="0"/>
+                <a:t>Tela Cinza</a:t>
+              </a:r>
+              <a:endParaRPr lang="pt-BR" sz="1200" dirty="0"/>
+            </a:p>
+          </p:txBody>
+        </p:sp>
+        <p:sp>
+          <p:nvSpPr>
+            <p:cNvPr id="18" name="CaixaDeTexto 17"/>
+            <p:cNvSpPr txBox="1"/>
+            <p:nvPr/>
+          </p:nvSpPr>
+          <p:spPr>
+            <a:xfrm>
+              <a:off x="3982410" y="2910135"/>
+              <a:ext cx="576064" cy="461665"/>
+            </a:xfrm>
+            <a:prstGeom prst="rect">
+              <a:avLst/>
+            </a:prstGeom>
+            <a:noFill/>
+          </p:spPr>
+          <p:txBody>
+            <a:bodyPr wrap="square" rtlCol="0">
+              <a:spAutoFit/>
+            </a:bodyPr>
+            <a:lstStyle/>
+            <a:p>
+              <a:pPr algn="ctr"/>
+              <a:r>
+                <a:rPr lang="pt-BR" sz="1200" dirty="0" smtClean="0"/>
+                <a:t>Tela Cinza</a:t>
+              </a:r>
+              <a:endParaRPr lang="pt-BR" sz="1200" dirty="0"/>
+            </a:p>
+          </p:txBody>
+        </p:sp>
+        <p:sp>
+          <p:nvSpPr>
+            <p:cNvPr id="19" name="CaixaDeTexto 18"/>
+            <p:cNvSpPr txBox="1"/>
+            <p:nvPr/>
+          </p:nvSpPr>
+          <p:spPr>
+            <a:xfrm>
+              <a:off x="5833081" y="2874131"/>
+              <a:ext cx="576064" cy="461665"/>
+            </a:xfrm>
+            <a:prstGeom prst="rect">
+              <a:avLst/>
+            </a:prstGeom>
+            <a:noFill/>
+          </p:spPr>
+          <p:txBody>
+            <a:bodyPr wrap="square" rtlCol="0">
+              <a:spAutoFit/>
+            </a:bodyPr>
+            <a:lstStyle/>
+            <a:p>
+              <a:pPr algn="ctr"/>
+              <a:r>
+                <a:rPr lang="pt-BR" sz="1200" dirty="0" smtClean="0"/>
+                <a:t>Tela Cinza</a:t>
+              </a:r>
+              <a:endParaRPr lang="pt-BR" sz="1200" dirty="0"/>
+            </a:p>
+          </p:txBody>
+        </p:sp>
+        <p:sp>
+          <p:nvSpPr>
+            <p:cNvPr id="20" name="CaixaDeTexto 19"/>
+            <p:cNvSpPr txBox="1"/>
+            <p:nvPr/>
+          </p:nvSpPr>
+          <p:spPr>
+            <a:xfrm>
+              <a:off x="7668344" y="2874131"/>
+              <a:ext cx="576064" cy="461665"/>
+            </a:xfrm>
+            <a:prstGeom prst="rect">
+              <a:avLst/>
+            </a:prstGeom>
+            <a:noFill/>
+          </p:spPr>
+          <p:txBody>
+            <a:bodyPr wrap="square" rtlCol="0">
+              <a:spAutoFit/>
+            </a:bodyPr>
+            <a:lstStyle/>
+            <a:p>
+              <a:pPr algn="ctr"/>
+              <a:r>
+                <a:rPr lang="pt-BR" sz="1200" dirty="0" smtClean="0"/>
+                <a:t>Tela Cinza</a:t>
+              </a:r>
+              <a:endParaRPr lang="pt-BR" sz="1200" dirty="0"/>
+            </a:p>
+          </p:txBody>
+        </p:sp>
+        <p:sp>
+          <p:nvSpPr>
+            <p:cNvPr id="21" name="CaixaDeTexto 20"/>
+            <p:cNvSpPr txBox="1"/>
+            <p:nvPr/>
+          </p:nvSpPr>
+          <p:spPr>
+            <a:xfrm>
+              <a:off x="1324380" y="2956301"/>
+              <a:ext cx="303288" cy="338554"/>
+            </a:xfrm>
+            <a:prstGeom prst="rect">
+              <a:avLst/>
+            </a:prstGeom>
+            <a:noFill/>
+          </p:spPr>
+          <p:txBody>
+            <a:bodyPr wrap="none" rtlCol="0">
+              <a:spAutoFit/>
+            </a:bodyPr>
+            <a:lstStyle/>
+            <a:p>
+              <a:r>
+                <a:rPr lang="pt-BR" sz="1600" dirty="0" smtClean="0"/>
+                <a:t>A</a:t>
+              </a:r>
+              <a:endParaRPr lang="pt-BR" sz="1600" dirty="0"/>
+            </a:p>
+          </p:txBody>
+        </p:sp>
+        <p:sp>
+          <p:nvSpPr>
+            <p:cNvPr id="23" name="CaixaDeTexto 22"/>
+            <p:cNvSpPr txBox="1"/>
+            <p:nvPr/>
+          </p:nvSpPr>
+          <p:spPr>
+            <a:xfrm>
+              <a:off x="3188592" y="2946430"/>
+              <a:ext cx="296876" cy="338554"/>
+            </a:xfrm>
+            <a:prstGeom prst="rect">
+              <a:avLst/>
+            </a:prstGeom>
+            <a:noFill/>
+          </p:spPr>
+          <p:txBody>
+            <a:bodyPr wrap="none" rtlCol="0">
+              <a:spAutoFit/>
+            </a:bodyPr>
+            <a:lstStyle/>
+            <a:p>
+              <a:r>
+                <a:rPr lang="pt-BR" sz="1600" dirty="0" smtClean="0"/>
+                <a:t>B</a:t>
+              </a:r>
+              <a:endParaRPr lang="pt-BR" sz="1600" dirty="0"/>
+            </a:p>
+          </p:txBody>
+        </p:sp>
+        <p:sp>
+          <p:nvSpPr>
+            <p:cNvPr id="24" name="CaixaDeTexto 23"/>
+            <p:cNvSpPr txBox="1"/>
+            <p:nvPr/>
+          </p:nvSpPr>
+          <p:spPr>
+            <a:xfrm>
+              <a:off x="5075208" y="2971690"/>
+              <a:ext cx="303288" cy="338554"/>
+            </a:xfrm>
+            <a:prstGeom prst="rect">
+              <a:avLst/>
+            </a:prstGeom>
+            <a:noFill/>
+          </p:spPr>
+          <p:txBody>
+            <a:bodyPr wrap="none" rtlCol="0">
+              <a:spAutoFit/>
+            </a:bodyPr>
+            <a:lstStyle/>
+            <a:p>
+              <a:r>
+                <a:rPr lang="pt-BR" sz="1600" dirty="0" smtClean="0"/>
+                <a:t>A</a:t>
+              </a:r>
+              <a:endParaRPr lang="pt-BR" sz="1600" dirty="0"/>
+            </a:p>
+          </p:txBody>
+        </p:sp>
+        <p:sp>
+          <p:nvSpPr>
+            <p:cNvPr id="25" name="CaixaDeTexto 24"/>
+            <p:cNvSpPr txBox="1"/>
+            <p:nvPr/>
+          </p:nvSpPr>
+          <p:spPr>
+            <a:xfrm>
+              <a:off x="6939420" y="2961819"/>
+              <a:ext cx="296876" cy="338554"/>
+            </a:xfrm>
+            <a:prstGeom prst="rect">
+              <a:avLst/>
+            </a:prstGeom>
+            <a:noFill/>
+          </p:spPr>
+          <p:txBody>
+            <a:bodyPr wrap="none" rtlCol="0">
+              <a:spAutoFit/>
+            </a:bodyPr>
+            <a:lstStyle/>
+            <a:p>
+              <a:r>
+                <a:rPr lang="pt-BR" sz="1600" dirty="0" smtClean="0"/>
+                <a:t>B</a:t>
+              </a:r>
+              <a:endParaRPr lang="pt-BR" sz="1600" dirty="0"/>
+            </a:p>
+          </p:txBody>
+        </p:sp>
+        <p:sp>
+          <p:nvSpPr>
+            <p:cNvPr id="26" name="CaixaDeTexto 25"/>
+            <p:cNvSpPr txBox="1"/>
+            <p:nvPr/>
+          </p:nvSpPr>
+          <p:spPr>
+            <a:xfrm>
+              <a:off x="1331594" y="3882534"/>
+              <a:ext cx="386644" cy="307777"/>
+            </a:xfrm>
+            <a:prstGeom prst="rect">
+              <a:avLst/>
+            </a:prstGeom>
+            <a:noFill/>
+          </p:spPr>
+          <p:txBody>
+            <a:bodyPr wrap="none" rtlCol="0">
+              <a:spAutoFit/>
+            </a:bodyPr>
+            <a:lstStyle/>
+            <a:p>
+              <a:r>
+                <a:rPr lang="pt-BR" sz="1400" dirty="0" smtClean="0"/>
+                <a:t>8 s</a:t>
+              </a:r>
+              <a:endParaRPr lang="pt-BR" sz="1400" dirty="0"/>
+            </a:p>
+          </p:txBody>
+        </p:sp>
+        <p:sp>
+          <p:nvSpPr>
+            <p:cNvPr id="27" name="CaixaDeTexto 26"/>
+            <p:cNvSpPr txBox="1"/>
+            <p:nvPr/>
+          </p:nvSpPr>
+          <p:spPr>
+            <a:xfrm>
+              <a:off x="2195736" y="3882534"/>
+              <a:ext cx="386644" cy="307777"/>
+            </a:xfrm>
+            <a:prstGeom prst="rect">
+              <a:avLst/>
+            </a:prstGeom>
+            <a:noFill/>
+          </p:spPr>
+          <p:txBody>
+            <a:bodyPr wrap="none" rtlCol="0">
+              <a:spAutoFit/>
+            </a:bodyPr>
+            <a:lstStyle/>
+            <a:p>
+              <a:r>
+                <a:rPr lang="pt-BR" sz="1400" dirty="0" smtClean="0"/>
+                <a:t>2 s</a:t>
+              </a:r>
+              <a:endParaRPr lang="pt-BR" sz="1400" dirty="0"/>
+            </a:p>
+          </p:txBody>
+        </p:sp>
+        <p:sp>
+          <p:nvSpPr>
+            <p:cNvPr id="28" name="CaixaDeTexto 27"/>
+            <p:cNvSpPr txBox="1"/>
+            <p:nvPr/>
+          </p:nvSpPr>
+          <p:spPr>
+            <a:xfrm>
+              <a:off x="3131840" y="3882533"/>
+              <a:ext cx="386644" cy="307777"/>
+            </a:xfrm>
+            <a:prstGeom prst="rect">
+              <a:avLst/>
+            </a:prstGeom>
+            <a:noFill/>
+          </p:spPr>
+          <p:txBody>
+            <a:bodyPr wrap="none" rtlCol="0">
+              <a:spAutoFit/>
+            </a:bodyPr>
+            <a:lstStyle/>
+            <a:p>
+              <a:r>
+                <a:rPr lang="pt-BR" sz="1400" dirty="0" smtClean="0"/>
+                <a:t>8 s</a:t>
+              </a:r>
+              <a:endParaRPr lang="pt-BR" sz="1400" dirty="0"/>
+            </a:p>
+          </p:txBody>
+        </p:sp>
+        <p:sp>
+          <p:nvSpPr>
+            <p:cNvPr id="29" name="CaixaDeTexto 28"/>
+            <p:cNvSpPr txBox="1"/>
+            <p:nvPr/>
+          </p:nvSpPr>
+          <p:spPr>
+            <a:xfrm>
+              <a:off x="4041340" y="3882533"/>
+              <a:ext cx="386644" cy="307777"/>
+            </a:xfrm>
+            <a:prstGeom prst="rect">
+              <a:avLst/>
+            </a:prstGeom>
+            <a:noFill/>
+          </p:spPr>
+          <p:txBody>
+            <a:bodyPr wrap="none" rtlCol="0">
+              <a:spAutoFit/>
+            </a:bodyPr>
+            <a:lstStyle/>
+            <a:p>
+              <a:r>
+                <a:rPr lang="pt-BR" sz="1400" dirty="0" smtClean="0"/>
+                <a:t>2 s</a:t>
+              </a:r>
+              <a:endParaRPr lang="pt-BR" sz="1400" dirty="0"/>
+            </a:p>
+          </p:txBody>
+        </p:sp>
+        <p:sp>
+          <p:nvSpPr>
+            <p:cNvPr id="30" name="CaixaDeTexto 29"/>
+            <p:cNvSpPr txBox="1"/>
+            <p:nvPr/>
+          </p:nvSpPr>
+          <p:spPr>
+            <a:xfrm>
+              <a:off x="5007208" y="3882532"/>
+              <a:ext cx="386644" cy="307777"/>
+            </a:xfrm>
+            <a:prstGeom prst="rect">
+              <a:avLst/>
+            </a:prstGeom>
+            <a:noFill/>
+          </p:spPr>
+          <p:txBody>
+            <a:bodyPr wrap="none" rtlCol="0">
+              <a:spAutoFit/>
+            </a:bodyPr>
+            <a:lstStyle/>
+            <a:p>
+              <a:r>
+                <a:rPr lang="pt-BR" sz="1400" dirty="0" smtClean="0"/>
+                <a:t>8 s</a:t>
+              </a:r>
+              <a:endParaRPr lang="pt-BR" sz="1400" dirty="0"/>
+            </a:p>
+          </p:txBody>
+        </p:sp>
+        <p:sp>
+          <p:nvSpPr>
+            <p:cNvPr id="31" name="CaixaDeTexto 30"/>
+            <p:cNvSpPr txBox="1"/>
+            <p:nvPr/>
+          </p:nvSpPr>
+          <p:spPr>
+            <a:xfrm>
+              <a:off x="5916708" y="3882532"/>
+              <a:ext cx="386644" cy="307777"/>
+            </a:xfrm>
+            <a:prstGeom prst="rect">
+              <a:avLst/>
+            </a:prstGeom>
+            <a:noFill/>
+          </p:spPr>
+          <p:txBody>
+            <a:bodyPr wrap="none" rtlCol="0">
+              <a:spAutoFit/>
+            </a:bodyPr>
+            <a:lstStyle/>
+            <a:p>
+              <a:r>
+                <a:rPr lang="pt-BR" sz="1400" dirty="0" smtClean="0"/>
+                <a:t>2 s</a:t>
+              </a:r>
+              <a:endParaRPr lang="pt-BR" sz="1400" dirty="0"/>
+            </a:p>
+          </p:txBody>
+        </p:sp>
+        <p:sp>
+          <p:nvSpPr>
+            <p:cNvPr id="32" name="CaixaDeTexto 31"/>
+            <p:cNvSpPr txBox="1"/>
+            <p:nvPr/>
+          </p:nvSpPr>
+          <p:spPr>
+            <a:xfrm>
+              <a:off x="6876256" y="3882531"/>
+              <a:ext cx="386644" cy="307777"/>
+            </a:xfrm>
+            <a:prstGeom prst="rect">
+              <a:avLst/>
+            </a:prstGeom>
+            <a:noFill/>
+          </p:spPr>
+          <p:txBody>
+            <a:bodyPr wrap="none" rtlCol="0">
+              <a:spAutoFit/>
+            </a:bodyPr>
+            <a:lstStyle/>
+            <a:p>
+              <a:r>
+                <a:rPr lang="pt-BR" sz="1400" dirty="0" smtClean="0"/>
+                <a:t>8 s</a:t>
+              </a:r>
+              <a:endParaRPr lang="pt-BR" sz="1400" dirty="0"/>
+            </a:p>
+          </p:txBody>
+        </p:sp>
+        <p:sp>
+          <p:nvSpPr>
+            <p:cNvPr id="33" name="CaixaDeTexto 32"/>
+            <p:cNvSpPr txBox="1"/>
+            <p:nvPr/>
+          </p:nvSpPr>
+          <p:spPr>
+            <a:xfrm>
+              <a:off x="7785756" y="3882531"/>
+              <a:ext cx="386644" cy="307777"/>
+            </a:xfrm>
+            <a:prstGeom prst="rect">
+              <a:avLst/>
+            </a:prstGeom>
+            <a:noFill/>
+          </p:spPr>
+          <p:txBody>
+            <a:bodyPr wrap="none" rtlCol="0">
+              <a:spAutoFit/>
+            </a:bodyPr>
+            <a:lstStyle/>
+            <a:p>
+              <a:r>
+                <a:rPr lang="pt-BR" sz="1400" dirty="0" smtClean="0"/>
+                <a:t>6 s</a:t>
+              </a:r>
+              <a:endParaRPr lang="pt-BR" sz="1400" dirty="0"/>
+            </a:p>
+          </p:txBody>
+        </p:sp>
+      </p:grpSp>
+    </p:spTree>
+    <p:extLst>
+      <p:ext uri="{BB962C8B-B14F-4D97-AF65-F5344CB8AC3E}">
+        <p14:creationId xmlns:p14="http://schemas.microsoft.com/office/powerpoint/2010/main" val="240158127"/>
       </p:ext>
     </p:extLst>
   </p:cSld>
@@ -6043,6 +7189,123 @@
         </p:nvSpPr>
         <p:spPr/>
         <p:txBody>
+          <a:bodyPr/>
+          <a:lstStyle/>
+          <a:p>
+            <a:r>
+              <a:rPr lang="pt-BR" dirty="0" smtClean="0"/>
+              <a:t>Mapa de profundidades</a:t>
+            </a:r>
+            <a:endParaRPr lang="pt-BR" dirty="0"/>
+          </a:p>
+        </p:txBody>
+      </p:sp>
+      <p:pic>
+        <p:nvPicPr>
+          <p:cNvPr id="1026" name="Picture 2"/>
+          <p:cNvPicPr>
+            <a:picLocks noChangeAspect="1" noChangeArrowheads="1"/>
+          </p:cNvPicPr>
+          <p:nvPr/>
+        </p:nvPicPr>
+        <p:blipFill>
+          <a:blip r:embed="rId2">
+            <a:extLst>
+              <a:ext uri="{28A0092B-C50C-407E-A947-70E740481C1C}">
+                <a14:useLocalDpi xmlns:a14="http://schemas.microsoft.com/office/drawing/2010/main" val="0"/>
+              </a:ext>
+            </a:extLst>
+          </a:blip>
+          <a:srcRect/>
+          <a:stretch>
+            <a:fillRect/>
+          </a:stretch>
+        </p:blipFill>
+        <p:spPr bwMode="auto">
+          <a:xfrm>
+            <a:off x="2051720" y="1728440"/>
+            <a:ext cx="5040560" cy="3399534"/>
+          </a:xfrm>
+          <a:prstGeom prst="rect">
+            <a:avLst/>
+          </a:prstGeom>
+          <a:noFill/>
+          <a:ln>
+            <a:noFill/>
+          </a:ln>
+          <a:effectLst/>
+          <a:extLst>
+            <a:ext uri="{909E8E84-426E-40DD-AFC4-6F175D3DCCD1}">
+              <a14:hiddenFill xmlns:a14="http://schemas.microsoft.com/office/drawing/2010/main">
+                <a:solidFill>
+                  <a:schemeClr val="accent1"/>
+                </a:solidFill>
+              </a14:hiddenFill>
+            </a:ext>
+            <a:ext uri="{91240B29-F687-4F45-9708-019B960494DF}">
+              <a14:hiddenLine xmlns:a14="http://schemas.microsoft.com/office/drawing/2010/main" w="9525">
+                <a:solidFill>
+                  <a:schemeClr val="tx1"/>
+                </a:solidFill>
+                <a:miter lim="800000"/>
+                <a:headEnd/>
+                <a:tailEnd/>
+              </a14:hiddenLine>
+            </a:ext>
+            <a:ext uri="{AF507438-7753-43E0-B8FC-AC1667EBCBE1}">
+              <a14:hiddenEffects xmlns:a14="http://schemas.microsoft.com/office/drawing/2010/main">
+                <a:effectLst>
+                  <a:outerShdw dist="35921" dir="2700000" algn="ctr" rotWithShape="0">
+                    <a:schemeClr val="bg2"/>
+                  </a:outerShdw>
+                </a:effectLst>
+              </a14:hiddenEffects>
+            </a:ext>
+          </a:extLst>
+        </p:spPr>
+      </p:pic>
+    </p:spTree>
+    <p:extLst>
+      <p:ext uri="{BB962C8B-B14F-4D97-AF65-F5344CB8AC3E}">
+        <p14:creationId xmlns:p14="http://schemas.microsoft.com/office/powerpoint/2010/main" val="8252091"/>
+      </p:ext>
+    </p:extLst>
+  </p:cSld>
+  <p:clrMapOvr>
+    <a:masterClrMapping/>
+  </p:clrMapOvr>
+</p:sld>
+</file>
+
+<file path=ppt/slides/slide8.xml><?xml version="1.0" encoding="utf-8"?>
+<p:sld xmlns:a="http://schemas.openxmlformats.org/drawingml/2006/main" xmlns:r="http://schemas.openxmlformats.org/officeDocument/2006/relationships" xmlns:p="http://schemas.openxmlformats.org/presentationml/2006/main">
+  <p:cSld>
+    <p:spTree>
+      <p:nvGrpSpPr>
+        <p:cNvPr id="1" name=""/>
+        <p:cNvGrpSpPr/>
+        <p:nvPr/>
+      </p:nvGrpSpPr>
+      <p:grpSpPr>
+        <a:xfrm>
+          <a:off x="0" y="0"/>
+          <a:ext cx="0" cy="0"/>
+          <a:chOff x="0" y="0"/>
+          <a:chExt cx="0" cy="0"/>
+        </a:xfrm>
+      </p:grpSpPr>
+      <p:sp>
+        <p:nvSpPr>
+          <p:cNvPr id="2" name="Título 1"/>
+          <p:cNvSpPr>
+            <a:spLocks noGrp="1"/>
+          </p:cNvSpPr>
+          <p:nvPr>
+            <p:ph type="title"/>
+          </p:nvPr>
+        </p:nvSpPr>
+        <p:spPr/>
+        <p:txBody>
           <a:bodyPr>
             <a:normAutofit/>
           </a:bodyPr>
@@ -6230,7 +7493,7 @@
 </p:sld>
 </file>
 
-<file path=ppt/slides/slide8.xml><?xml version="1.0" encoding="utf-8"?>
+<file path=ppt/slides/slide9.xml><?xml version="1.0" encoding="utf-8"?>
 <p:sld xmlns:a="http://schemas.openxmlformats.org/drawingml/2006/main" xmlns:r="http://schemas.openxmlformats.org/officeDocument/2006/relationships" xmlns:p="http://schemas.openxmlformats.org/presentationml/2006/main">
   <p:cSld>
     <p:spTree>
@@ -6431,1151 +7694,6 @@
     <p:extLst>
       <p:ext uri="{BB962C8B-B14F-4D97-AF65-F5344CB8AC3E}">
         <p14:creationId xmlns:p14="http://schemas.microsoft.com/office/powerpoint/2010/main" val="1555048651"/>
-      </p:ext>
-    </p:extLst>
-  </p:cSld>
-  <p:clrMapOvr>
-    <a:masterClrMapping/>
-  </p:clrMapOvr>
-</p:sld>
-</file>
-
-<file path=ppt/slides/slide9.xml><?xml version="1.0" encoding="utf-8"?>
-<p:sld xmlns:a="http://schemas.openxmlformats.org/drawingml/2006/main" xmlns:r="http://schemas.openxmlformats.org/officeDocument/2006/relationships" xmlns:p="http://schemas.openxmlformats.org/presentationml/2006/main">
-  <p:cSld>
-    <p:spTree>
-      <p:nvGrpSpPr>
-        <p:cNvPr id="1" name=""/>
-        <p:cNvGrpSpPr/>
-        <p:nvPr/>
-      </p:nvGrpSpPr>
-      <p:grpSpPr>
-        <a:xfrm>
-          <a:off x="0" y="0"/>
-          <a:ext cx="0" cy="0"/>
-          <a:chOff x="0" y="0"/>
-          <a:chExt cx="0" cy="0"/>
-        </a:xfrm>
-      </p:grpSpPr>
-      <p:sp>
-        <p:nvSpPr>
-          <p:cNvPr id="2" name="Título 1"/>
-          <p:cNvSpPr>
-            <a:spLocks noGrp="1"/>
-          </p:cNvSpPr>
-          <p:nvPr>
-            <p:ph type="title"/>
-          </p:nvPr>
-        </p:nvSpPr>
-        <p:spPr/>
-        <p:txBody>
-          <a:bodyPr/>
-          <a:lstStyle/>
-          <a:p>
-            <a:r>
-              <a:rPr lang="pt-BR" dirty="0" smtClean="0"/>
-              <a:t>DSCQS</a:t>
-            </a:r>
-            <a:endParaRPr lang="pt-BR" dirty="0"/>
-          </a:p>
-        </p:txBody>
-      </p:sp>
-      <p:grpSp>
-        <p:nvGrpSpPr>
-          <p:cNvPr id="22" name="Grupo 21"/>
-          <p:cNvGrpSpPr/>
-          <p:nvPr/>
-        </p:nvGrpSpPr>
-        <p:grpSpPr>
-          <a:xfrm>
-            <a:off x="755576" y="2781300"/>
-            <a:ext cx="7605796" cy="1727820"/>
-            <a:chOff x="755576" y="2781300"/>
-            <a:chExt cx="7605796" cy="1727820"/>
-          </a:xfrm>
-        </p:grpSpPr>
-        <p:pic>
-          <p:nvPicPr>
-            <p:cNvPr id="3074" name="Picture 2"/>
-            <p:cNvPicPr>
-              <a:picLocks noChangeAspect="1" noChangeArrowheads="1"/>
-            </p:cNvPicPr>
-            <p:nvPr/>
-          </p:nvPicPr>
-          <p:blipFill>
-            <a:blip r:embed="rId2">
-              <a:extLst>
-                <a:ext uri="{BEBA8EAE-BF5A-486C-A8C5-ECC9F3942E4B}">
-                  <a14:imgProps xmlns:a14="http://schemas.microsoft.com/office/drawing/2010/main">
-                    <a14:imgLayer r:embed="rId3">
-                      <a14:imgEffect>
-                        <a14:sharpenSoften amount="25000"/>
-                      </a14:imgEffect>
-                    </a14:imgLayer>
-                  </a14:imgProps>
-                </a:ext>
-                <a:ext uri="{28A0092B-C50C-407E-A947-70E740481C1C}">
-                  <a14:useLocalDpi xmlns:a14="http://schemas.microsoft.com/office/drawing/2010/main" val="0"/>
-                </a:ext>
-              </a:extLst>
-            </a:blip>
-            <a:srcRect/>
-            <a:stretch>
-              <a:fillRect/>
-            </a:stretch>
-          </p:blipFill>
-          <p:spPr bwMode="auto">
-            <a:xfrm>
-              <a:off x="755576" y="2781300"/>
-              <a:ext cx="7605796" cy="1727820"/>
-            </a:xfrm>
-            <a:prstGeom prst="rect">
-              <a:avLst/>
-            </a:prstGeom>
-            <a:noFill/>
-            <a:ln>
-              <a:noFill/>
-            </a:ln>
-            <a:effectLst/>
-            <a:extLst>
-              <a:ext uri="{909E8E84-426E-40DD-AFC4-6F175D3DCCD1}">
-                <a14:hiddenFill xmlns:a14="http://schemas.microsoft.com/office/drawing/2010/main">
-                  <a:solidFill>
-                    <a:schemeClr val="accent1"/>
-                  </a:solidFill>
-                </a14:hiddenFill>
-              </a:ext>
-              <a:ext uri="{91240B29-F687-4F45-9708-019B960494DF}">
-                <a14:hiddenLine xmlns:a14="http://schemas.microsoft.com/office/drawing/2010/main" w="9525">
-                  <a:solidFill>
-                    <a:schemeClr val="tx1"/>
-                  </a:solidFill>
-                  <a:miter lim="800000"/>
-                  <a:headEnd/>
-                  <a:tailEnd/>
-                </a14:hiddenLine>
-              </a:ext>
-              <a:ext uri="{AF507438-7753-43E0-B8FC-AC1667EBCBE1}">
-                <a14:hiddenEffects xmlns:a14="http://schemas.microsoft.com/office/drawing/2010/main">
-                  <a:effectLst>
-                    <a:outerShdw dist="35921" dir="2700000" algn="ctr" rotWithShape="0">
-                      <a:schemeClr val="bg2"/>
-                    </a:outerShdw>
-                  </a:effectLst>
-                </a14:hiddenEffects>
-              </a:ext>
-            </a:extLst>
-          </p:spPr>
-        </p:pic>
-        <p:sp>
-          <p:nvSpPr>
-            <p:cNvPr id="5" name="Retângulo 4"/>
-            <p:cNvSpPr/>
-            <p:nvPr/>
-          </p:nvSpPr>
-          <p:spPr>
-            <a:xfrm>
-              <a:off x="1043608" y="2960948"/>
-              <a:ext cx="879260" cy="1116124"/>
-            </a:xfrm>
-            <a:prstGeom prst="rect">
-              <a:avLst/>
-            </a:prstGeom>
-            <a:solidFill>
-              <a:schemeClr val="bg1"/>
-            </a:solidFill>
-            <a:ln>
-              <a:solidFill>
-                <a:schemeClr val="bg1"/>
-              </a:solidFill>
-            </a:ln>
-          </p:spPr>
-          <p:style>
-            <a:lnRef idx="2">
-              <a:schemeClr val="accent1">
-                <a:shade val="50000"/>
-              </a:schemeClr>
-            </a:lnRef>
-            <a:fillRef idx="1">
-              <a:schemeClr val="accent1"/>
-            </a:fillRef>
-            <a:effectRef idx="0">
-              <a:schemeClr val="accent1"/>
-            </a:effectRef>
-            <a:fontRef idx="minor">
-              <a:schemeClr val="lt1"/>
-            </a:fontRef>
-          </p:style>
-          <p:txBody>
-            <a:bodyPr rtlCol="0" anchor="ctr"/>
-            <a:lstStyle/>
-            <a:p>
-              <a:pPr algn="ctr"/>
-              <a:r>
-                <a:rPr lang="pt-BR" dirty="0" smtClean="0"/>
-                <a:t>A</a:t>
-              </a:r>
-              <a:endParaRPr lang="pt-BR" dirty="0"/>
-            </a:p>
-          </p:txBody>
-        </p:sp>
-        <p:sp>
-          <p:nvSpPr>
-            <p:cNvPr id="7" name="Retângulo 6"/>
-            <p:cNvSpPr/>
-            <p:nvPr/>
-          </p:nvSpPr>
-          <p:spPr>
-            <a:xfrm>
-              <a:off x="2987824" y="2960948"/>
-              <a:ext cx="879260" cy="1260140"/>
-            </a:xfrm>
-            <a:prstGeom prst="rect">
-              <a:avLst/>
-            </a:prstGeom>
-            <a:solidFill>
-              <a:schemeClr val="bg1"/>
-            </a:solidFill>
-            <a:ln>
-              <a:solidFill>
-                <a:schemeClr val="bg1"/>
-              </a:solidFill>
-            </a:ln>
-          </p:spPr>
-          <p:style>
-            <a:lnRef idx="2">
-              <a:schemeClr val="accent1">
-                <a:shade val="50000"/>
-              </a:schemeClr>
-            </a:lnRef>
-            <a:fillRef idx="1">
-              <a:schemeClr val="accent1"/>
-            </a:fillRef>
-            <a:effectRef idx="0">
-              <a:schemeClr val="accent1"/>
-            </a:effectRef>
-            <a:fontRef idx="minor">
-              <a:schemeClr val="lt1"/>
-            </a:fontRef>
-          </p:style>
-          <p:txBody>
-            <a:bodyPr rtlCol="0" anchor="ctr"/>
-            <a:lstStyle/>
-            <a:p>
-              <a:pPr algn="ctr"/>
-              <a:endParaRPr lang="pt-BR"/>
-            </a:p>
-          </p:txBody>
-        </p:sp>
-        <p:sp>
-          <p:nvSpPr>
-            <p:cNvPr id="8" name="Retângulo 7"/>
-            <p:cNvSpPr/>
-            <p:nvPr/>
-          </p:nvSpPr>
-          <p:spPr>
-            <a:xfrm>
-              <a:off x="4716016" y="2960948"/>
-              <a:ext cx="879260" cy="1116124"/>
-            </a:xfrm>
-            <a:prstGeom prst="rect">
-              <a:avLst/>
-            </a:prstGeom>
-            <a:solidFill>
-              <a:schemeClr val="bg1"/>
-            </a:solidFill>
-            <a:ln>
-              <a:solidFill>
-                <a:schemeClr val="bg1"/>
-              </a:solidFill>
-            </a:ln>
-          </p:spPr>
-          <p:style>
-            <a:lnRef idx="2">
-              <a:schemeClr val="accent1">
-                <a:shade val="50000"/>
-              </a:schemeClr>
-            </a:lnRef>
-            <a:fillRef idx="1">
-              <a:schemeClr val="accent1"/>
-            </a:fillRef>
-            <a:effectRef idx="0">
-              <a:schemeClr val="accent1"/>
-            </a:effectRef>
-            <a:fontRef idx="minor">
-              <a:schemeClr val="lt1"/>
-            </a:fontRef>
-          </p:style>
-          <p:txBody>
-            <a:bodyPr rtlCol="0" anchor="ctr"/>
-            <a:lstStyle/>
-            <a:p>
-              <a:pPr algn="ctr"/>
-              <a:endParaRPr lang="pt-BR"/>
-            </a:p>
-          </p:txBody>
-        </p:sp>
-        <p:sp>
-          <p:nvSpPr>
-            <p:cNvPr id="9" name="Retângulo 8"/>
-            <p:cNvSpPr/>
-            <p:nvPr/>
-          </p:nvSpPr>
-          <p:spPr>
-            <a:xfrm>
-              <a:off x="6588224" y="2960948"/>
-              <a:ext cx="879260" cy="1260140"/>
-            </a:xfrm>
-            <a:prstGeom prst="rect">
-              <a:avLst/>
-            </a:prstGeom>
-            <a:solidFill>
-              <a:schemeClr val="bg1"/>
-            </a:solidFill>
-            <a:ln>
-              <a:solidFill>
-                <a:schemeClr val="bg1"/>
-              </a:solidFill>
-            </a:ln>
-          </p:spPr>
-          <p:style>
-            <a:lnRef idx="2">
-              <a:schemeClr val="accent1">
-                <a:shade val="50000"/>
-              </a:schemeClr>
-            </a:lnRef>
-            <a:fillRef idx="1">
-              <a:schemeClr val="accent1"/>
-            </a:fillRef>
-            <a:effectRef idx="0">
-              <a:schemeClr val="accent1"/>
-            </a:effectRef>
-            <a:fontRef idx="minor">
-              <a:schemeClr val="lt1"/>
-            </a:fontRef>
-          </p:style>
-          <p:txBody>
-            <a:bodyPr rtlCol="0" anchor="ctr"/>
-            <a:lstStyle/>
-            <a:p>
-              <a:pPr algn="ctr"/>
-              <a:endParaRPr lang="pt-BR"/>
-            </a:p>
-          </p:txBody>
-        </p:sp>
-        <p:sp>
-          <p:nvSpPr>
-            <p:cNvPr id="4" name="CaixaDeTexto 3"/>
-            <p:cNvSpPr txBox="1"/>
-            <p:nvPr/>
-          </p:nvSpPr>
-          <p:spPr>
-            <a:xfrm>
-              <a:off x="1007604" y="3284984"/>
-              <a:ext cx="951268" cy="461665"/>
-            </a:xfrm>
-            <a:prstGeom prst="rect">
-              <a:avLst/>
-            </a:prstGeom>
-            <a:solidFill>
-              <a:schemeClr val="bg1"/>
-            </a:solidFill>
-          </p:spPr>
-          <p:txBody>
-            <a:bodyPr wrap="square" rtlCol="0">
-              <a:spAutoFit/>
-            </a:bodyPr>
-            <a:lstStyle/>
-            <a:p>
-              <a:pPr algn="ctr"/>
-              <a:r>
-                <a:rPr lang="pt-BR" sz="1200" dirty="0" smtClean="0"/>
-                <a:t>Original ou processado</a:t>
-              </a:r>
-              <a:endParaRPr lang="pt-BR" sz="1200" dirty="0"/>
-            </a:p>
-          </p:txBody>
-        </p:sp>
-        <p:sp>
-          <p:nvSpPr>
-            <p:cNvPr id="10" name="CaixaDeTexto 9"/>
-            <p:cNvSpPr txBox="1"/>
-            <p:nvPr/>
-          </p:nvSpPr>
-          <p:spPr>
-            <a:xfrm>
-              <a:off x="2828644" y="3284984"/>
-              <a:ext cx="951268" cy="461665"/>
-            </a:xfrm>
-            <a:prstGeom prst="rect">
-              <a:avLst/>
-            </a:prstGeom>
-            <a:solidFill>
-              <a:schemeClr val="bg1"/>
-            </a:solidFill>
-          </p:spPr>
-          <p:txBody>
-            <a:bodyPr wrap="square" rtlCol="0">
-              <a:spAutoFit/>
-            </a:bodyPr>
-            <a:lstStyle/>
-            <a:p>
-              <a:pPr algn="ctr"/>
-              <a:r>
-                <a:rPr lang="pt-BR" sz="1200" dirty="0" smtClean="0"/>
-                <a:t>Original ou processado</a:t>
-              </a:r>
-              <a:endParaRPr lang="pt-BR" sz="1200" dirty="0"/>
-            </a:p>
-          </p:txBody>
-        </p:sp>
-        <p:sp>
-          <p:nvSpPr>
-            <p:cNvPr id="11" name="CaixaDeTexto 10"/>
-            <p:cNvSpPr txBox="1"/>
-            <p:nvPr/>
-          </p:nvSpPr>
-          <p:spPr>
-            <a:xfrm>
-              <a:off x="4724896" y="3284984"/>
-              <a:ext cx="951268" cy="461665"/>
-            </a:xfrm>
-            <a:prstGeom prst="rect">
-              <a:avLst/>
-            </a:prstGeom>
-            <a:solidFill>
-              <a:schemeClr val="bg1"/>
-            </a:solidFill>
-          </p:spPr>
-          <p:txBody>
-            <a:bodyPr wrap="square" rtlCol="0">
-              <a:spAutoFit/>
-            </a:bodyPr>
-            <a:lstStyle/>
-            <a:p>
-              <a:pPr algn="ctr"/>
-              <a:r>
-                <a:rPr lang="pt-BR" sz="1200" dirty="0" smtClean="0"/>
-                <a:t>Original ou processado</a:t>
-              </a:r>
-              <a:endParaRPr lang="pt-BR" sz="1200" dirty="0"/>
-            </a:p>
-          </p:txBody>
-        </p:sp>
-        <p:sp>
-          <p:nvSpPr>
-            <p:cNvPr id="12" name="CaixaDeTexto 11"/>
-            <p:cNvSpPr txBox="1"/>
-            <p:nvPr/>
-          </p:nvSpPr>
-          <p:spPr>
-            <a:xfrm>
-              <a:off x="6588224" y="3284984"/>
-              <a:ext cx="951268" cy="461665"/>
-            </a:xfrm>
-            <a:prstGeom prst="rect">
-              <a:avLst/>
-            </a:prstGeom>
-            <a:solidFill>
-              <a:schemeClr val="bg1"/>
-            </a:solidFill>
-          </p:spPr>
-          <p:txBody>
-            <a:bodyPr wrap="square" rtlCol="0">
-              <a:spAutoFit/>
-            </a:bodyPr>
-            <a:lstStyle/>
-            <a:p>
-              <a:pPr algn="ctr"/>
-              <a:r>
-                <a:rPr lang="pt-BR" sz="1200" dirty="0" smtClean="0"/>
-                <a:t>Original ou processado</a:t>
-              </a:r>
-              <a:endParaRPr lang="pt-BR" sz="1200" dirty="0"/>
-            </a:p>
-          </p:txBody>
-        </p:sp>
-        <p:sp>
-          <p:nvSpPr>
-            <p:cNvPr id="6" name="Retângulo 5"/>
-            <p:cNvSpPr/>
-            <p:nvPr/>
-          </p:nvSpPr>
-          <p:spPr>
-            <a:xfrm>
-              <a:off x="2195736" y="2924944"/>
-              <a:ext cx="432048" cy="1152128"/>
-            </a:xfrm>
-            <a:prstGeom prst="rect">
-              <a:avLst/>
-            </a:prstGeom>
-            <a:solidFill>
-              <a:schemeClr val="bg1"/>
-            </a:solidFill>
-            <a:ln>
-              <a:solidFill>
-                <a:schemeClr val="bg1"/>
-              </a:solidFill>
-            </a:ln>
-          </p:spPr>
-          <p:style>
-            <a:lnRef idx="2">
-              <a:schemeClr val="accent1">
-                <a:shade val="50000"/>
-              </a:schemeClr>
-            </a:lnRef>
-            <a:fillRef idx="1">
-              <a:schemeClr val="accent1"/>
-            </a:fillRef>
-            <a:effectRef idx="0">
-              <a:schemeClr val="accent1"/>
-            </a:effectRef>
-            <a:fontRef idx="minor">
-              <a:schemeClr val="lt1"/>
-            </a:fontRef>
-          </p:style>
-          <p:txBody>
-            <a:bodyPr rtlCol="0" anchor="ctr"/>
-            <a:lstStyle/>
-            <a:p>
-              <a:pPr algn="ctr"/>
-              <a:endParaRPr lang="pt-BR"/>
-            </a:p>
-          </p:txBody>
-        </p:sp>
-        <p:sp>
-          <p:nvSpPr>
-            <p:cNvPr id="14" name="Retângulo 13"/>
-            <p:cNvSpPr/>
-            <p:nvPr/>
-          </p:nvSpPr>
-          <p:spPr>
-            <a:xfrm>
-              <a:off x="3995936" y="2960948"/>
-              <a:ext cx="432048" cy="1116124"/>
-            </a:xfrm>
-            <a:prstGeom prst="rect">
-              <a:avLst/>
-            </a:prstGeom>
-            <a:solidFill>
-              <a:schemeClr val="bg1"/>
-            </a:solidFill>
-            <a:ln>
-              <a:solidFill>
-                <a:schemeClr val="bg1"/>
-              </a:solidFill>
-            </a:ln>
-          </p:spPr>
-          <p:style>
-            <a:lnRef idx="2">
-              <a:schemeClr val="accent1">
-                <a:shade val="50000"/>
-              </a:schemeClr>
-            </a:lnRef>
-            <a:fillRef idx="1">
-              <a:schemeClr val="accent1"/>
-            </a:fillRef>
-            <a:effectRef idx="0">
-              <a:schemeClr val="accent1"/>
-            </a:effectRef>
-            <a:fontRef idx="minor">
-              <a:schemeClr val="lt1"/>
-            </a:fontRef>
-          </p:style>
-          <p:txBody>
-            <a:bodyPr rtlCol="0" anchor="ctr"/>
-            <a:lstStyle/>
-            <a:p>
-              <a:pPr algn="ctr"/>
-              <a:endParaRPr lang="pt-BR"/>
-            </a:p>
-          </p:txBody>
-        </p:sp>
-        <p:sp>
-          <p:nvSpPr>
-            <p:cNvPr id="15" name="Retângulo 14"/>
-            <p:cNvSpPr/>
-            <p:nvPr/>
-          </p:nvSpPr>
-          <p:spPr>
-            <a:xfrm>
-              <a:off x="5940152" y="2924944"/>
-              <a:ext cx="432048" cy="1152128"/>
-            </a:xfrm>
-            <a:prstGeom prst="rect">
-              <a:avLst/>
-            </a:prstGeom>
-            <a:solidFill>
-              <a:schemeClr val="bg1"/>
-            </a:solidFill>
-            <a:ln>
-              <a:solidFill>
-                <a:schemeClr val="bg1"/>
-              </a:solidFill>
-            </a:ln>
-          </p:spPr>
-          <p:style>
-            <a:lnRef idx="2">
-              <a:schemeClr val="accent1">
-                <a:shade val="50000"/>
-              </a:schemeClr>
-            </a:lnRef>
-            <a:fillRef idx="1">
-              <a:schemeClr val="accent1"/>
-            </a:fillRef>
-            <a:effectRef idx="0">
-              <a:schemeClr val="accent1"/>
-            </a:effectRef>
-            <a:fontRef idx="minor">
-              <a:schemeClr val="lt1"/>
-            </a:fontRef>
-          </p:style>
-          <p:txBody>
-            <a:bodyPr rtlCol="0" anchor="ctr"/>
-            <a:lstStyle/>
-            <a:p>
-              <a:pPr algn="ctr"/>
-              <a:endParaRPr lang="pt-BR"/>
-            </a:p>
-          </p:txBody>
-        </p:sp>
-        <p:sp>
-          <p:nvSpPr>
-            <p:cNvPr id="16" name="Retângulo 15"/>
-            <p:cNvSpPr/>
-            <p:nvPr/>
-          </p:nvSpPr>
-          <p:spPr>
-            <a:xfrm>
-              <a:off x="7740352" y="2917252"/>
-              <a:ext cx="432048" cy="1159819"/>
-            </a:xfrm>
-            <a:prstGeom prst="rect">
-              <a:avLst/>
-            </a:prstGeom>
-            <a:solidFill>
-              <a:schemeClr val="bg1"/>
-            </a:solidFill>
-            <a:ln>
-              <a:solidFill>
-                <a:schemeClr val="bg1"/>
-              </a:solidFill>
-            </a:ln>
-          </p:spPr>
-          <p:style>
-            <a:lnRef idx="2">
-              <a:schemeClr val="accent1">
-                <a:shade val="50000"/>
-              </a:schemeClr>
-            </a:lnRef>
-            <a:fillRef idx="1">
-              <a:schemeClr val="accent1"/>
-            </a:fillRef>
-            <a:effectRef idx="0">
-              <a:schemeClr val="accent1"/>
-            </a:effectRef>
-            <a:fontRef idx="minor">
-              <a:schemeClr val="lt1"/>
-            </a:fontRef>
-          </p:style>
-          <p:txBody>
-            <a:bodyPr rtlCol="0" anchor="ctr"/>
-            <a:lstStyle/>
-            <a:p>
-              <a:pPr algn="ctr"/>
-              <a:endParaRPr lang="pt-BR"/>
-            </a:p>
-          </p:txBody>
-        </p:sp>
-        <p:sp>
-          <p:nvSpPr>
-            <p:cNvPr id="13" name="CaixaDeTexto 12"/>
-            <p:cNvSpPr txBox="1"/>
-            <p:nvPr/>
-          </p:nvSpPr>
-          <p:spPr>
-            <a:xfrm>
-              <a:off x="2123728" y="2910135"/>
-              <a:ext cx="576064" cy="461665"/>
-            </a:xfrm>
-            <a:prstGeom prst="rect">
-              <a:avLst/>
-            </a:prstGeom>
-            <a:noFill/>
-          </p:spPr>
-          <p:txBody>
-            <a:bodyPr wrap="square" rtlCol="0">
-              <a:spAutoFit/>
-            </a:bodyPr>
-            <a:lstStyle/>
-            <a:p>
-              <a:pPr algn="ctr"/>
-              <a:r>
-                <a:rPr lang="pt-BR" sz="1200" dirty="0" smtClean="0"/>
-                <a:t>Tela Cinza</a:t>
-              </a:r>
-              <a:endParaRPr lang="pt-BR" sz="1200" dirty="0"/>
-            </a:p>
-          </p:txBody>
-        </p:sp>
-        <p:sp>
-          <p:nvSpPr>
-            <p:cNvPr id="18" name="CaixaDeTexto 17"/>
-            <p:cNvSpPr txBox="1"/>
-            <p:nvPr/>
-          </p:nvSpPr>
-          <p:spPr>
-            <a:xfrm>
-              <a:off x="3982410" y="2910135"/>
-              <a:ext cx="576064" cy="461665"/>
-            </a:xfrm>
-            <a:prstGeom prst="rect">
-              <a:avLst/>
-            </a:prstGeom>
-            <a:noFill/>
-          </p:spPr>
-          <p:txBody>
-            <a:bodyPr wrap="square" rtlCol="0">
-              <a:spAutoFit/>
-            </a:bodyPr>
-            <a:lstStyle/>
-            <a:p>
-              <a:pPr algn="ctr"/>
-              <a:r>
-                <a:rPr lang="pt-BR" sz="1200" dirty="0" smtClean="0"/>
-                <a:t>Tela Cinza</a:t>
-              </a:r>
-              <a:endParaRPr lang="pt-BR" sz="1200" dirty="0"/>
-            </a:p>
-          </p:txBody>
-        </p:sp>
-        <p:sp>
-          <p:nvSpPr>
-            <p:cNvPr id="19" name="CaixaDeTexto 18"/>
-            <p:cNvSpPr txBox="1"/>
-            <p:nvPr/>
-          </p:nvSpPr>
-          <p:spPr>
-            <a:xfrm>
-              <a:off x="5833081" y="2874131"/>
-              <a:ext cx="576064" cy="461665"/>
-            </a:xfrm>
-            <a:prstGeom prst="rect">
-              <a:avLst/>
-            </a:prstGeom>
-            <a:noFill/>
-          </p:spPr>
-          <p:txBody>
-            <a:bodyPr wrap="square" rtlCol="0">
-              <a:spAutoFit/>
-            </a:bodyPr>
-            <a:lstStyle/>
-            <a:p>
-              <a:pPr algn="ctr"/>
-              <a:r>
-                <a:rPr lang="pt-BR" sz="1200" dirty="0" smtClean="0"/>
-                <a:t>Tela Cinza</a:t>
-              </a:r>
-              <a:endParaRPr lang="pt-BR" sz="1200" dirty="0"/>
-            </a:p>
-          </p:txBody>
-        </p:sp>
-        <p:sp>
-          <p:nvSpPr>
-            <p:cNvPr id="20" name="CaixaDeTexto 19"/>
-            <p:cNvSpPr txBox="1"/>
-            <p:nvPr/>
-          </p:nvSpPr>
-          <p:spPr>
-            <a:xfrm>
-              <a:off x="7668344" y="2874131"/>
-              <a:ext cx="576064" cy="461665"/>
-            </a:xfrm>
-            <a:prstGeom prst="rect">
-              <a:avLst/>
-            </a:prstGeom>
-            <a:noFill/>
-          </p:spPr>
-          <p:txBody>
-            <a:bodyPr wrap="square" rtlCol="0">
-              <a:spAutoFit/>
-            </a:bodyPr>
-            <a:lstStyle/>
-            <a:p>
-              <a:pPr algn="ctr"/>
-              <a:r>
-                <a:rPr lang="pt-BR" sz="1200" dirty="0" smtClean="0"/>
-                <a:t>Tela Cinza</a:t>
-              </a:r>
-              <a:endParaRPr lang="pt-BR" sz="1200" dirty="0"/>
-            </a:p>
-          </p:txBody>
-        </p:sp>
-        <p:sp>
-          <p:nvSpPr>
-            <p:cNvPr id="21" name="CaixaDeTexto 20"/>
-            <p:cNvSpPr txBox="1"/>
-            <p:nvPr/>
-          </p:nvSpPr>
-          <p:spPr>
-            <a:xfrm>
-              <a:off x="1324380" y="2956301"/>
-              <a:ext cx="303288" cy="338554"/>
-            </a:xfrm>
-            <a:prstGeom prst="rect">
-              <a:avLst/>
-            </a:prstGeom>
-            <a:noFill/>
-          </p:spPr>
-          <p:txBody>
-            <a:bodyPr wrap="none" rtlCol="0">
-              <a:spAutoFit/>
-            </a:bodyPr>
-            <a:lstStyle/>
-            <a:p>
-              <a:r>
-                <a:rPr lang="pt-BR" sz="1600" dirty="0" smtClean="0"/>
-                <a:t>A</a:t>
-              </a:r>
-              <a:endParaRPr lang="pt-BR" sz="1600" dirty="0"/>
-            </a:p>
-          </p:txBody>
-        </p:sp>
-        <p:sp>
-          <p:nvSpPr>
-            <p:cNvPr id="23" name="CaixaDeTexto 22"/>
-            <p:cNvSpPr txBox="1"/>
-            <p:nvPr/>
-          </p:nvSpPr>
-          <p:spPr>
-            <a:xfrm>
-              <a:off x="3188592" y="2946430"/>
-              <a:ext cx="296876" cy="338554"/>
-            </a:xfrm>
-            <a:prstGeom prst="rect">
-              <a:avLst/>
-            </a:prstGeom>
-            <a:noFill/>
-          </p:spPr>
-          <p:txBody>
-            <a:bodyPr wrap="none" rtlCol="0">
-              <a:spAutoFit/>
-            </a:bodyPr>
-            <a:lstStyle/>
-            <a:p>
-              <a:r>
-                <a:rPr lang="pt-BR" sz="1600" dirty="0" smtClean="0"/>
-                <a:t>B</a:t>
-              </a:r>
-              <a:endParaRPr lang="pt-BR" sz="1600" dirty="0"/>
-            </a:p>
-          </p:txBody>
-        </p:sp>
-        <p:sp>
-          <p:nvSpPr>
-            <p:cNvPr id="24" name="CaixaDeTexto 23"/>
-            <p:cNvSpPr txBox="1"/>
-            <p:nvPr/>
-          </p:nvSpPr>
-          <p:spPr>
-            <a:xfrm>
-              <a:off x="5075208" y="2971690"/>
-              <a:ext cx="303288" cy="338554"/>
-            </a:xfrm>
-            <a:prstGeom prst="rect">
-              <a:avLst/>
-            </a:prstGeom>
-            <a:noFill/>
-          </p:spPr>
-          <p:txBody>
-            <a:bodyPr wrap="none" rtlCol="0">
-              <a:spAutoFit/>
-            </a:bodyPr>
-            <a:lstStyle/>
-            <a:p>
-              <a:r>
-                <a:rPr lang="pt-BR" sz="1600" dirty="0" smtClean="0"/>
-                <a:t>A</a:t>
-              </a:r>
-              <a:endParaRPr lang="pt-BR" sz="1600" dirty="0"/>
-            </a:p>
-          </p:txBody>
-        </p:sp>
-        <p:sp>
-          <p:nvSpPr>
-            <p:cNvPr id="25" name="CaixaDeTexto 24"/>
-            <p:cNvSpPr txBox="1"/>
-            <p:nvPr/>
-          </p:nvSpPr>
-          <p:spPr>
-            <a:xfrm>
-              <a:off x="6939420" y="2961819"/>
-              <a:ext cx="296876" cy="338554"/>
-            </a:xfrm>
-            <a:prstGeom prst="rect">
-              <a:avLst/>
-            </a:prstGeom>
-            <a:noFill/>
-          </p:spPr>
-          <p:txBody>
-            <a:bodyPr wrap="none" rtlCol="0">
-              <a:spAutoFit/>
-            </a:bodyPr>
-            <a:lstStyle/>
-            <a:p>
-              <a:r>
-                <a:rPr lang="pt-BR" sz="1600" dirty="0" smtClean="0"/>
-                <a:t>B</a:t>
-              </a:r>
-              <a:endParaRPr lang="pt-BR" sz="1600" dirty="0"/>
-            </a:p>
-          </p:txBody>
-        </p:sp>
-        <p:sp>
-          <p:nvSpPr>
-            <p:cNvPr id="26" name="CaixaDeTexto 25"/>
-            <p:cNvSpPr txBox="1"/>
-            <p:nvPr/>
-          </p:nvSpPr>
-          <p:spPr>
-            <a:xfrm>
-              <a:off x="1331594" y="3882534"/>
-              <a:ext cx="386644" cy="307777"/>
-            </a:xfrm>
-            <a:prstGeom prst="rect">
-              <a:avLst/>
-            </a:prstGeom>
-            <a:noFill/>
-          </p:spPr>
-          <p:txBody>
-            <a:bodyPr wrap="none" rtlCol="0">
-              <a:spAutoFit/>
-            </a:bodyPr>
-            <a:lstStyle/>
-            <a:p>
-              <a:r>
-                <a:rPr lang="pt-BR" sz="1400" dirty="0" smtClean="0"/>
-                <a:t>8 s</a:t>
-              </a:r>
-              <a:endParaRPr lang="pt-BR" sz="1400" dirty="0"/>
-            </a:p>
-          </p:txBody>
-        </p:sp>
-        <p:sp>
-          <p:nvSpPr>
-            <p:cNvPr id="27" name="CaixaDeTexto 26"/>
-            <p:cNvSpPr txBox="1"/>
-            <p:nvPr/>
-          </p:nvSpPr>
-          <p:spPr>
-            <a:xfrm>
-              <a:off x="2195736" y="3882534"/>
-              <a:ext cx="386644" cy="307777"/>
-            </a:xfrm>
-            <a:prstGeom prst="rect">
-              <a:avLst/>
-            </a:prstGeom>
-            <a:noFill/>
-          </p:spPr>
-          <p:txBody>
-            <a:bodyPr wrap="none" rtlCol="0">
-              <a:spAutoFit/>
-            </a:bodyPr>
-            <a:lstStyle/>
-            <a:p>
-              <a:r>
-                <a:rPr lang="pt-BR" sz="1400" dirty="0" smtClean="0"/>
-                <a:t>2 s</a:t>
-              </a:r>
-              <a:endParaRPr lang="pt-BR" sz="1400" dirty="0"/>
-            </a:p>
-          </p:txBody>
-        </p:sp>
-        <p:sp>
-          <p:nvSpPr>
-            <p:cNvPr id="28" name="CaixaDeTexto 27"/>
-            <p:cNvSpPr txBox="1"/>
-            <p:nvPr/>
-          </p:nvSpPr>
-          <p:spPr>
-            <a:xfrm>
-              <a:off x="3131840" y="3882533"/>
-              <a:ext cx="386644" cy="307777"/>
-            </a:xfrm>
-            <a:prstGeom prst="rect">
-              <a:avLst/>
-            </a:prstGeom>
-            <a:noFill/>
-          </p:spPr>
-          <p:txBody>
-            <a:bodyPr wrap="none" rtlCol="0">
-              <a:spAutoFit/>
-            </a:bodyPr>
-            <a:lstStyle/>
-            <a:p>
-              <a:r>
-                <a:rPr lang="pt-BR" sz="1400" dirty="0" smtClean="0"/>
-                <a:t>8 s</a:t>
-              </a:r>
-              <a:endParaRPr lang="pt-BR" sz="1400" dirty="0"/>
-            </a:p>
-          </p:txBody>
-        </p:sp>
-        <p:sp>
-          <p:nvSpPr>
-            <p:cNvPr id="29" name="CaixaDeTexto 28"/>
-            <p:cNvSpPr txBox="1"/>
-            <p:nvPr/>
-          </p:nvSpPr>
-          <p:spPr>
-            <a:xfrm>
-              <a:off x="4041340" y="3882533"/>
-              <a:ext cx="386644" cy="307777"/>
-            </a:xfrm>
-            <a:prstGeom prst="rect">
-              <a:avLst/>
-            </a:prstGeom>
-            <a:noFill/>
-          </p:spPr>
-          <p:txBody>
-            <a:bodyPr wrap="none" rtlCol="0">
-              <a:spAutoFit/>
-            </a:bodyPr>
-            <a:lstStyle/>
-            <a:p>
-              <a:r>
-                <a:rPr lang="pt-BR" sz="1400" dirty="0" smtClean="0"/>
-                <a:t>2 s</a:t>
-              </a:r>
-              <a:endParaRPr lang="pt-BR" sz="1400" dirty="0"/>
-            </a:p>
-          </p:txBody>
-        </p:sp>
-        <p:sp>
-          <p:nvSpPr>
-            <p:cNvPr id="30" name="CaixaDeTexto 29"/>
-            <p:cNvSpPr txBox="1"/>
-            <p:nvPr/>
-          </p:nvSpPr>
-          <p:spPr>
-            <a:xfrm>
-              <a:off x="5007208" y="3882532"/>
-              <a:ext cx="386644" cy="307777"/>
-            </a:xfrm>
-            <a:prstGeom prst="rect">
-              <a:avLst/>
-            </a:prstGeom>
-            <a:noFill/>
-          </p:spPr>
-          <p:txBody>
-            <a:bodyPr wrap="none" rtlCol="0">
-              <a:spAutoFit/>
-            </a:bodyPr>
-            <a:lstStyle/>
-            <a:p>
-              <a:r>
-                <a:rPr lang="pt-BR" sz="1400" dirty="0" smtClean="0"/>
-                <a:t>8 s</a:t>
-              </a:r>
-              <a:endParaRPr lang="pt-BR" sz="1400" dirty="0"/>
-            </a:p>
-          </p:txBody>
-        </p:sp>
-        <p:sp>
-          <p:nvSpPr>
-            <p:cNvPr id="31" name="CaixaDeTexto 30"/>
-            <p:cNvSpPr txBox="1"/>
-            <p:nvPr/>
-          </p:nvSpPr>
-          <p:spPr>
-            <a:xfrm>
-              <a:off x="5916708" y="3882532"/>
-              <a:ext cx="386644" cy="307777"/>
-            </a:xfrm>
-            <a:prstGeom prst="rect">
-              <a:avLst/>
-            </a:prstGeom>
-            <a:noFill/>
-          </p:spPr>
-          <p:txBody>
-            <a:bodyPr wrap="none" rtlCol="0">
-              <a:spAutoFit/>
-            </a:bodyPr>
-            <a:lstStyle/>
-            <a:p>
-              <a:r>
-                <a:rPr lang="pt-BR" sz="1400" dirty="0" smtClean="0"/>
-                <a:t>2 s</a:t>
-              </a:r>
-              <a:endParaRPr lang="pt-BR" sz="1400" dirty="0"/>
-            </a:p>
-          </p:txBody>
-        </p:sp>
-        <p:sp>
-          <p:nvSpPr>
-            <p:cNvPr id="32" name="CaixaDeTexto 31"/>
-            <p:cNvSpPr txBox="1"/>
-            <p:nvPr/>
-          </p:nvSpPr>
-          <p:spPr>
-            <a:xfrm>
-              <a:off x="6876256" y="3882531"/>
-              <a:ext cx="386644" cy="307777"/>
-            </a:xfrm>
-            <a:prstGeom prst="rect">
-              <a:avLst/>
-            </a:prstGeom>
-            <a:noFill/>
-          </p:spPr>
-          <p:txBody>
-            <a:bodyPr wrap="none" rtlCol="0">
-              <a:spAutoFit/>
-            </a:bodyPr>
-            <a:lstStyle/>
-            <a:p>
-              <a:r>
-                <a:rPr lang="pt-BR" sz="1400" dirty="0" smtClean="0"/>
-                <a:t>8 s</a:t>
-              </a:r>
-              <a:endParaRPr lang="pt-BR" sz="1400" dirty="0"/>
-            </a:p>
-          </p:txBody>
-        </p:sp>
-        <p:sp>
-          <p:nvSpPr>
-            <p:cNvPr id="33" name="CaixaDeTexto 32"/>
-            <p:cNvSpPr txBox="1"/>
-            <p:nvPr/>
-          </p:nvSpPr>
-          <p:spPr>
-            <a:xfrm>
-              <a:off x="7785756" y="3882531"/>
-              <a:ext cx="386644" cy="307777"/>
-            </a:xfrm>
-            <a:prstGeom prst="rect">
-              <a:avLst/>
-            </a:prstGeom>
-            <a:noFill/>
-          </p:spPr>
-          <p:txBody>
-            <a:bodyPr wrap="none" rtlCol="0">
-              <a:spAutoFit/>
-            </a:bodyPr>
-            <a:lstStyle/>
-            <a:p>
-              <a:r>
-                <a:rPr lang="pt-BR" sz="1400" dirty="0" smtClean="0"/>
-                <a:t>6 s</a:t>
-              </a:r>
-              <a:endParaRPr lang="pt-BR" sz="1400" dirty="0"/>
-            </a:p>
-          </p:txBody>
-        </p:sp>
-      </p:grpSp>
-    </p:spTree>
-    <p:extLst>
-      <p:ext uri="{BB962C8B-B14F-4D97-AF65-F5344CB8AC3E}">
-        <p14:creationId xmlns:p14="http://schemas.microsoft.com/office/powerpoint/2010/main" val="240158127"/>
       </p:ext>
     </p:extLst>
   </p:cSld>

</xml_diff>

<commit_message>
Mestrado - versão final da monografia de qualificacao. - novas imagens inseridas no arquivo de imagens
Currículo
- link para download da versão em pdf da monografia da quali
</commit_message>
<xml_diff>
--- a/Imagens/imagens-quali.pptx
+++ b/Imagens/imagens-quali.pptx
@@ -15,6 +15,7 @@
     <p:sldId id="263" r:id="rId9"/>
     <p:sldId id="264" r:id="rId10"/>
     <p:sldId id="265" r:id="rId11"/>
+    <p:sldId id="267" r:id="rId12"/>
   </p:sldIdLst>
   <p:sldSz cx="9144000" cy="6858000" type="screen4x3"/>
   <p:notesSz cx="6858000" cy="9144000"/>
@@ -297,7 +298,7 @@
           <a:p>
             <a:fld id="{E14A8D8A-9BF6-4F09-B8D2-3E331CA72F09}" type="datetimeFigureOut">
               <a:rPr lang="pt-BR" smtClean="0"/>
-              <a:t>28/7/2011</a:t>
+              <a:t>2/8/2011</a:t>
             </a:fld>
             <a:endParaRPr lang="pt-BR"/>
           </a:p>
@@ -467,7 +468,7 @@
           <a:p>
             <a:fld id="{E14A8D8A-9BF6-4F09-B8D2-3E331CA72F09}" type="datetimeFigureOut">
               <a:rPr lang="pt-BR" smtClean="0"/>
-              <a:t>28/7/2011</a:t>
+              <a:t>2/8/2011</a:t>
             </a:fld>
             <a:endParaRPr lang="pt-BR"/>
           </a:p>
@@ -647,7 +648,7 @@
           <a:p>
             <a:fld id="{E14A8D8A-9BF6-4F09-B8D2-3E331CA72F09}" type="datetimeFigureOut">
               <a:rPr lang="pt-BR" smtClean="0"/>
-              <a:t>28/7/2011</a:t>
+              <a:t>2/8/2011</a:t>
             </a:fld>
             <a:endParaRPr lang="pt-BR"/>
           </a:p>
@@ -817,7 +818,7 @@
           <a:p>
             <a:fld id="{E14A8D8A-9BF6-4F09-B8D2-3E331CA72F09}" type="datetimeFigureOut">
               <a:rPr lang="pt-BR" smtClean="0"/>
-              <a:t>28/7/2011</a:t>
+              <a:t>2/8/2011</a:t>
             </a:fld>
             <a:endParaRPr lang="pt-BR"/>
           </a:p>
@@ -1063,7 +1064,7 @@
           <a:p>
             <a:fld id="{E14A8D8A-9BF6-4F09-B8D2-3E331CA72F09}" type="datetimeFigureOut">
               <a:rPr lang="pt-BR" smtClean="0"/>
-              <a:t>28/7/2011</a:t>
+              <a:t>2/8/2011</a:t>
             </a:fld>
             <a:endParaRPr lang="pt-BR"/>
           </a:p>
@@ -1351,7 +1352,7 @@
           <a:p>
             <a:fld id="{E14A8D8A-9BF6-4F09-B8D2-3E331CA72F09}" type="datetimeFigureOut">
               <a:rPr lang="pt-BR" smtClean="0"/>
-              <a:t>28/7/2011</a:t>
+              <a:t>2/8/2011</a:t>
             </a:fld>
             <a:endParaRPr lang="pt-BR"/>
           </a:p>
@@ -1773,7 +1774,7 @@
           <a:p>
             <a:fld id="{E14A8D8A-9BF6-4F09-B8D2-3E331CA72F09}" type="datetimeFigureOut">
               <a:rPr lang="pt-BR" smtClean="0"/>
-              <a:t>28/7/2011</a:t>
+              <a:t>2/8/2011</a:t>
             </a:fld>
             <a:endParaRPr lang="pt-BR"/>
           </a:p>
@@ -1891,7 +1892,7 @@
           <a:p>
             <a:fld id="{E14A8D8A-9BF6-4F09-B8D2-3E331CA72F09}" type="datetimeFigureOut">
               <a:rPr lang="pt-BR" smtClean="0"/>
-              <a:t>28/7/2011</a:t>
+              <a:t>2/8/2011</a:t>
             </a:fld>
             <a:endParaRPr lang="pt-BR"/>
           </a:p>
@@ -1986,7 +1987,7 @@
           <a:p>
             <a:fld id="{E14A8D8A-9BF6-4F09-B8D2-3E331CA72F09}" type="datetimeFigureOut">
               <a:rPr lang="pt-BR" smtClean="0"/>
-              <a:t>28/7/2011</a:t>
+              <a:t>2/8/2011</a:t>
             </a:fld>
             <a:endParaRPr lang="pt-BR"/>
           </a:p>
@@ -2263,7 +2264,7 @@
           <a:p>
             <a:fld id="{E14A8D8A-9BF6-4F09-B8D2-3E331CA72F09}" type="datetimeFigureOut">
               <a:rPr lang="pt-BR" smtClean="0"/>
-              <a:t>28/7/2011</a:t>
+              <a:t>2/8/2011</a:t>
             </a:fld>
             <a:endParaRPr lang="pt-BR"/>
           </a:p>
@@ -2516,7 +2517,7 @@
           <a:p>
             <a:fld id="{E14A8D8A-9BF6-4F09-B8D2-3E331CA72F09}" type="datetimeFigureOut">
               <a:rPr lang="pt-BR" smtClean="0"/>
-              <a:t>28/7/2011</a:t>
+              <a:t>2/8/2011</a:t>
             </a:fld>
             <a:endParaRPr lang="pt-BR"/>
           </a:p>
@@ -2729,7 +2730,7 @@
           <a:p>
             <a:fld id="{E14A8D8A-9BF6-4F09-B8D2-3E331CA72F09}" type="datetimeFigureOut">
               <a:rPr lang="pt-BR" smtClean="0"/>
-              <a:t>28/7/2011</a:t>
+              <a:t>2/8/2011</a:t>
             </a:fld>
             <a:endParaRPr lang="pt-BR"/>
           </a:p>
@@ -4312,6 +4313,392 @@
 </p:sld>
 </file>
 
+<file path=ppt/slides/slide11.xml><?xml version="1.0" encoding="utf-8"?>
+<p:sld xmlns:a="http://schemas.openxmlformats.org/drawingml/2006/main" xmlns:r="http://schemas.openxmlformats.org/officeDocument/2006/relationships" xmlns:p="http://schemas.openxmlformats.org/presentationml/2006/main">
+  <p:cSld>
+    <p:spTree>
+      <p:nvGrpSpPr>
+        <p:cNvPr id="1" name=""/>
+        <p:cNvGrpSpPr/>
+        <p:nvPr/>
+      </p:nvGrpSpPr>
+      <p:grpSpPr>
+        <a:xfrm>
+          <a:off x="0" y="0"/>
+          <a:ext cx="0" cy="0"/>
+          <a:chOff x="0" y="0"/>
+          <a:chExt cx="0" cy="0"/>
+        </a:xfrm>
+      </p:grpSpPr>
+      <p:sp>
+        <p:nvSpPr>
+          <p:cNvPr id="2" name="Título 1"/>
+          <p:cNvSpPr>
+            <a:spLocks noGrp="1"/>
+          </p:cNvSpPr>
+          <p:nvPr>
+            <p:ph type="title"/>
+          </p:nvPr>
+        </p:nvSpPr>
+        <p:spPr/>
+        <p:txBody>
+          <a:bodyPr/>
+          <a:lstStyle/>
+          <a:p>
+            <a:r>
+              <a:rPr lang="pt-BR" dirty="0" smtClean="0"/>
+              <a:t>Tabela DSCQS</a:t>
+            </a:r>
+            <a:endParaRPr lang="pt-BR" dirty="0"/>
+          </a:p>
+        </p:txBody>
+      </p:sp>
+      <p:sp>
+        <p:nvSpPr>
+          <p:cNvPr id="7" name="CaixaDeTexto 6"/>
+          <p:cNvSpPr txBox="1"/>
+          <p:nvPr/>
+        </p:nvSpPr>
+        <p:spPr>
+          <a:xfrm>
+            <a:off x="3564423" y="5426952"/>
+            <a:ext cx="288032" cy="369332"/>
+          </a:xfrm>
+          <a:prstGeom prst="rect">
+            <a:avLst/>
+          </a:prstGeom>
+          <a:noFill/>
+        </p:spPr>
+        <p:txBody>
+          <a:bodyPr wrap="square" rtlCol="0">
+            <a:spAutoFit/>
+          </a:bodyPr>
+          <a:lstStyle/>
+          <a:p>
+            <a:r>
+              <a:rPr lang="pt-BR" dirty="0" smtClean="0"/>
+              <a:t>0</a:t>
+            </a:r>
+            <a:endParaRPr lang="pt-BR" dirty="0"/>
+          </a:p>
+        </p:txBody>
+      </p:sp>
+      <p:sp>
+        <p:nvSpPr>
+          <p:cNvPr id="10" name="CaixaDeTexto 9"/>
+          <p:cNvSpPr txBox="1"/>
+          <p:nvPr/>
+        </p:nvSpPr>
+        <p:spPr>
+          <a:xfrm>
+            <a:off x="3419871" y="1948346"/>
+            <a:ext cx="576065" cy="369332"/>
+          </a:xfrm>
+          <a:prstGeom prst="rect">
+            <a:avLst/>
+          </a:prstGeom>
+          <a:noFill/>
+        </p:spPr>
+        <p:txBody>
+          <a:bodyPr wrap="square" rtlCol="0">
+            <a:spAutoFit/>
+          </a:bodyPr>
+          <a:lstStyle/>
+          <a:p>
+            <a:r>
+              <a:rPr lang="pt-BR" dirty="0" smtClean="0"/>
+              <a:t>100</a:t>
+            </a:r>
+            <a:endParaRPr lang="pt-BR" dirty="0"/>
+          </a:p>
+        </p:txBody>
+      </p:sp>
+      <p:sp>
+        <p:nvSpPr>
+          <p:cNvPr id="9" name="CaixaDeTexto 8"/>
+          <p:cNvSpPr txBox="1"/>
+          <p:nvPr/>
+        </p:nvSpPr>
+        <p:spPr>
+          <a:xfrm>
+            <a:off x="5220070" y="2317029"/>
+            <a:ext cx="1440160" cy="369332"/>
+          </a:xfrm>
+          <a:prstGeom prst="rect">
+            <a:avLst/>
+          </a:prstGeom>
+          <a:noFill/>
+        </p:spPr>
+        <p:txBody>
+          <a:bodyPr wrap="square" rtlCol="0">
+            <a:spAutoFit/>
+          </a:bodyPr>
+          <a:lstStyle/>
+          <a:p>
+            <a:r>
+              <a:rPr lang="pt-BR" dirty="0" smtClean="0"/>
+              <a:t>Excelente</a:t>
+            </a:r>
+            <a:endParaRPr lang="pt-BR" dirty="0"/>
+          </a:p>
+        </p:txBody>
+      </p:sp>
+      <p:sp>
+        <p:nvSpPr>
+          <p:cNvPr id="12" name="CaixaDeTexto 11"/>
+          <p:cNvSpPr txBox="1"/>
+          <p:nvPr/>
+        </p:nvSpPr>
+        <p:spPr>
+          <a:xfrm>
+            <a:off x="5220070" y="2996952"/>
+            <a:ext cx="1440160" cy="369332"/>
+          </a:xfrm>
+          <a:prstGeom prst="rect">
+            <a:avLst/>
+          </a:prstGeom>
+          <a:noFill/>
+        </p:spPr>
+        <p:txBody>
+          <a:bodyPr wrap="square" rtlCol="0">
+            <a:spAutoFit/>
+          </a:bodyPr>
+          <a:lstStyle/>
+          <a:p>
+            <a:r>
+              <a:rPr lang="pt-BR" dirty="0" smtClean="0"/>
+              <a:t>Bom</a:t>
+            </a:r>
+            <a:endParaRPr lang="pt-BR" dirty="0"/>
+          </a:p>
+        </p:txBody>
+      </p:sp>
+      <p:sp>
+        <p:nvSpPr>
+          <p:cNvPr id="13" name="CaixaDeTexto 12"/>
+          <p:cNvSpPr txBox="1"/>
+          <p:nvPr/>
+        </p:nvSpPr>
+        <p:spPr>
+          <a:xfrm>
+            <a:off x="5220070" y="3712542"/>
+            <a:ext cx="1440160" cy="369332"/>
+          </a:xfrm>
+          <a:prstGeom prst="rect">
+            <a:avLst/>
+          </a:prstGeom>
+          <a:noFill/>
+        </p:spPr>
+        <p:txBody>
+          <a:bodyPr wrap="square" rtlCol="0">
+            <a:spAutoFit/>
+          </a:bodyPr>
+          <a:lstStyle/>
+          <a:p>
+            <a:r>
+              <a:rPr lang="pt-BR" dirty="0" smtClean="0"/>
+              <a:t>Razoável</a:t>
+            </a:r>
+            <a:endParaRPr lang="pt-BR" dirty="0"/>
+          </a:p>
+        </p:txBody>
+      </p:sp>
+      <p:sp>
+        <p:nvSpPr>
+          <p:cNvPr id="14" name="CaixaDeTexto 13"/>
+          <p:cNvSpPr txBox="1"/>
+          <p:nvPr/>
+        </p:nvSpPr>
+        <p:spPr>
+          <a:xfrm>
+            <a:off x="5220070" y="4365104"/>
+            <a:ext cx="1440160" cy="369332"/>
+          </a:xfrm>
+          <a:prstGeom prst="rect">
+            <a:avLst/>
+          </a:prstGeom>
+          <a:noFill/>
+        </p:spPr>
+        <p:txBody>
+          <a:bodyPr wrap="square" rtlCol="0">
+            <a:spAutoFit/>
+          </a:bodyPr>
+          <a:lstStyle/>
+          <a:p>
+            <a:r>
+              <a:rPr lang="pt-BR" dirty="0" smtClean="0"/>
+              <a:t>Ruim</a:t>
+            </a:r>
+            <a:endParaRPr lang="pt-BR" dirty="0"/>
+          </a:p>
+        </p:txBody>
+      </p:sp>
+      <p:sp>
+        <p:nvSpPr>
+          <p:cNvPr id="15" name="CaixaDeTexto 14"/>
+          <p:cNvSpPr txBox="1"/>
+          <p:nvPr/>
+        </p:nvSpPr>
+        <p:spPr>
+          <a:xfrm>
+            <a:off x="5220070" y="5035329"/>
+            <a:ext cx="1440160" cy="369332"/>
+          </a:xfrm>
+          <a:prstGeom prst="rect">
+            <a:avLst/>
+          </a:prstGeom>
+          <a:noFill/>
+        </p:spPr>
+        <p:txBody>
+          <a:bodyPr wrap="square" rtlCol="0">
+            <a:spAutoFit/>
+          </a:bodyPr>
+          <a:lstStyle/>
+          <a:p>
+            <a:r>
+              <a:rPr lang="pt-BR" dirty="0" smtClean="0"/>
+              <a:t>Péssimo</a:t>
+            </a:r>
+            <a:endParaRPr lang="pt-BR" dirty="0"/>
+          </a:p>
+        </p:txBody>
+      </p:sp>
+      <p:sp>
+        <p:nvSpPr>
+          <p:cNvPr id="11" name="CaixaDeTexto 10"/>
+          <p:cNvSpPr txBox="1"/>
+          <p:nvPr/>
+        </p:nvSpPr>
+        <p:spPr>
+          <a:xfrm>
+            <a:off x="3995936" y="1628800"/>
+            <a:ext cx="324036" cy="369332"/>
+          </a:xfrm>
+          <a:prstGeom prst="rect">
+            <a:avLst/>
+          </a:prstGeom>
+          <a:noFill/>
+        </p:spPr>
+        <p:txBody>
+          <a:bodyPr wrap="square" rtlCol="0">
+            <a:spAutoFit/>
+          </a:bodyPr>
+          <a:lstStyle/>
+          <a:p>
+            <a:r>
+              <a:rPr lang="pt-BR" dirty="0" smtClean="0"/>
+              <a:t>A</a:t>
+            </a:r>
+            <a:endParaRPr lang="pt-BR" dirty="0"/>
+          </a:p>
+        </p:txBody>
+      </p:sp>
+      <p:sp>
+        <p:nvSpPr>
+          <p:cNvPr id="17" name="CaixaDeTexto 16"/>
+          <p:cNvSpPr txBox="1"/>
+          <p:nvPr/>
+        </p:nvSpPr>
+        <p:spPr>
+          <a:xfrm>
+            <a:off x="4770021" y="1628800"/>
+            <a:ext cx="324036" cy="369332"/>
+          </a:xfrm>
+          <a:prstGeom prst="rect">
+            <a:avLst/>
+          </a:prstGeom>
+          <a:noFill/>
+        </p:spPr>
+        <p:txBody>
+          <a:bodyPr wrap="square" rtlCol="0">
+            <a:spAutoFit/>
+          </a:bodyPr>
+          <a:lstStyle/>
+          <a:p>
+            <a:pPr algn="r"/>
+            <a:r>
+              <a:rPr lang="pt-BR" dirty="0" smtClean="0"/>
+              <a:t>B</a:t>
+            </a:r>
+            <a:endParaRPr lang="pt-BR" dirty="0"/>
+          </a:p>
+        </p:txBody>
+      </p:sp>
+      <p:pic>
+        <p:nvPicPr>
+          <p:cNvPr id="1026" name="Picture 2"/>
+          <p:cNvPicPr>
+            <a:picLocks noChangeAspect="1" noChangeArrowheads="1"/>
+          </p:cNvPicPr>
+          <p:nvPr/>
+        </p:nvPicPr>
+        <p:blipFill rotWithShape="1">
+          <a:blip r:embed="rId2">
+            <a:extLst>
+              <a:ext uri="{28A0092B-C50C-407E-A947-70E740481C1C}">
+                <a14:useLocalDpi xmlns:a14="http://schemas.microsoft.com/office/drawing/2010/main" val="0"/>
+              </a:ext>
+            </a:extLst>
+          </a:blip>
+          <a:srcRect l="18766" t="10118" r="41666"/>
+          <a:stretch/>
+        </p:blipFill>
+        <p:spPr bwMode="auto">
+          <a:xfrm>
+            <a:off x="3924463" y="2050472"/>
+            <a:ext cx="1367617" cy="3745811"/>
+          </a:xfrm>
+          <a:prstGeom prst="rect">
+            <a:avLst/>
+          </a:prstGeom>
+          <a:noFill/>
+          <a:ln>
+            <a:noFill/>
+          </a:ln>
+          <a:effectLst/>
+          <a:extLst>
+            <a:ext uri="{909E8E84-426E-40DD-AFC4-6F175D3DCCD1}">
+              <a14:hiddenFill xmlns:a14="http://schemas.microsoft.com/office/drawing/2010/main">
+                <a:solidFill>
+                  <a:schemeClr val="accent1"/>
+                </a:solidFill>
+              </a14:hiddenFill>
+            </a:ext>
+            <a:ext uri="{91240B29-F687-4F45-9708-019B960494DF}">
+              <a14:hiddenLine xmlns:a14="http://schemas.microsoft.com/office/drawing/2010/main" w="9525">
+                <a:solidFill>
+                  <a:schemeClr val="tx1"/>
+                </a:solidFill>
+                <a:miter lim="800000"/>
+                <a:headEnd/>
+                <a:tailEnd/>
+              </a14:hiddenLine>
+            </a:ext>
+            <a:ext uri="{AF507438-7753-43E0-B8FC-AC1667EBCBE1}">
+              <a14:hiddenEffects xmlns:a14="http://schemas.microsoft.com/office/drawing/2010/main">
+                <a:effectLst>
+                  <a:outerShdw dist="35921" dir="2700000" algn="ctr" rotWithShape="0">
+                    <a:schemeClr val="bg2"/>
+                  </a:outerShdw>
+                </a:effectLst>
+              </a14:hiddenEffects>
+            </a:ext>
+          </a:extLst>
+        </p:spPr>
+      </p:pic>
+    </p:spTree>
+    <p:extLst>
+      <p:ext uri="{BB962C8B-B14F-4D97-AF65-F5344CB8AC3E}">
+        <p14:creationId xmlns:p14="http://schemas.microsoft.com/office/powerpoint/2010/main" val="899611975"/>
+      </p:ext>
+    </p:extLst>
+  </p:cSld>
+  <p:clrMapOvr>
+    <a:masterClrMapping/>
+  </p:clrMapOvr>
+</p:sld>
+</file>
+
 <file path=ppt/slides/slide2.xml><?xml version="1.0" encoding="utf-8"?>
 <p:sld xmlns:a="http://schemas.openxmlformats.org/drawingml/2006/main" xmlns:r="http://schemas.openxmlformats.org/officeDocument/2006/relationships" xmlns:p="http://schemas.openxmlformats.org/presentationml/2006/main">
   <p:cSld>
@@ -5043,7 +5430,7 @@
                 <a:avLst/>
               </a:prstGeom>
               <a:solidFill>
-                <a:srgbClr val="FF0000"/>
+                <a:srgbClr val="FF5353"/>
               </a:solidFill>
             </p:spPr>
             <p:style>
@@ -5106,7 +5493,7 @@
                 <a:avLst/>
               </a:prstGeom>
               <a:solidFill>
-                <a:srgbClr val="00FF00"/>
+                <a:srgbClr val="71FF71"/>
               </a:solidFill>
             </p:spPr>
             <p:style>
@@ -5169,7 +5556,7 @@
                 <a:avLst/>
               </a:prstGeom>
               <a:solidFill>
-                <a:srgbClr val="0000FF"/>
+                <a:srgbClr val="6565FF"/>
               </a:solidFill>
             </p:spPr>
             <p:style>
@@ -5271,7 +5658,7 @@
               <a:avLst/>
             </a:prstGeom>
             <a:solidFill>
-              <a:srgbClr val="FF0000"/>
+              <a:srgbClr val="FF5353"/>
             </a:solidFill>
           </p:spPr>
           <p:style>
@@ -5334,7 +5721,7 @@
               <a:avLst/>
             </a:prstGeom>
             <a:solidFill>
-              <a:srgbClr val="00FF00"/>
+              <a:srgbClr val="71FF71"/>
             </a:solidFill>
           </p:spPr>
           <p:style>
@@ -5397,7 +5784,7 @@
               <a:avLst/>
             </a:prstGeom>
             <a:solidFill>
-              <a:srgbClr val="0000FF"/>
+              <a:srgbClr val="6565FF"/>
             </a:solidFill>
           </p:spPr>
           <p:style>
@@ -5850,7 +6237,7 @@
               <a:avLst/>
             </a:prstGeom>
             <a:solidFill>
-              <a:srgbClr val="FF0000"/>
+              <a:srgbClr val="FF5353"/>
             </a:solidFill>
           </p:spPr>
           <p:style>
@@ -5951,7 +6338,7 @@
               <a:avLst/>
             </a:prstGeom>
             <a:solidFill>
-              <a:srgbClr val="0000FF"/>
+              <a:srgbClr val="6565FF"/>
             </a:solidFill>
           </p:spPr>
           <p:style>
@@ -6014,7 +6401,7 @@
               <a:avLst/>
             </a:prstGeom>
             <a:solidFill>
-              <a:srgbClr val="00FF00"/>
+              <a:srgbClr val="71FF71"/>
             </a:solidFill>
           </p:spPr>
           <p:style>
@@ -6129,7 +6516,7 @@
                 <a:avLst/>
               </a:prstGeom>
               <a:solidFill>
-                <a:srgbClr val="FF0000"/>
+                <a:srgbClr val="FF5353"/>
               </a:solidFill>
             </p:spPr>
             <p:style>
@@ -6192,7 +6579,7 @@
                 <a:avLst/>
               </a:prstGeom>
               <a:solidFill>
-                <a:srgbClr val="00FF00"/>
+                <a:srgbClr val="71FF71"/>
               </a:solidFill>
             </p:spPr>
             <p:style>
@@ -6255,7 +6642,7 @@
                 <a:avLst/>
               </a:prstGeom>
               <a:solidFill>
-                <a:srgbClr val="0000FF"/>
+                <a:srgbClr val="6565FF"/>
               </a:solidFill>
             </p:spPr>
             <p:style>

</xml_diff>